<commit_message>
added to do to VCS slides
</commit_message>
<xml_diff>
--- a/Lectures/VCS_Git_GitHub.pptx
+++ b/Lectures/VCS_Git_GitHub.pptx
@@ -5,17 +5,20 @@
     <p:sldMasterId id="2147483648" r:id="rId1"/>
   </p:sldMasterIdLst>
   <p:notesMasterIdLst>
-    <p:notesMasterId r:id="rId10"/>
+    <p:notesMasterId r:id="rId13"/>
   </p:notesMasterIdLst>
   <p:sldIdLst>
     <p:sldId id="345" r:id="rId2"/>
     <p:sldId id="346" r:id="rId3"/>
     <p:sldId id="348" r:id="rId4"/>
     <p:sldId id="351" r:id="rId5"/>
-    <p:sldId id="350" r:id="rId6"/>
-    <p:sldId id="352" r:id="rId7"/>
-    <p:sldId id="355" r:id="rId8"/>
-    <p:sldId id="356" r:id="rId9"/>
+    <p:sldId id="358" r:id="rId6"/>
+    <p:sldId id="359" r:id="rId7"/>
+    <p:sldId id="350" r:id="rId8"/>
+    <p:sldId id="352" r:id="rId9"/>
+    <p:sldId id="355" r:id="rId10"/>
+    <p:sldId id="356" r:id="rId11"/>
+    <p:sldId id="361" r:id="rId12"/>
   </p:sldIdLst>
   <p:sldSz cx="13004800" cy="8128000"/>
   <p:notesSz cx="6858000" cy="9144000"/>
@@ -2736,17 +2739,6 @@
               </a:rPr>
               <a:t>, &amp; GitHub</a:t>
             </a:r>
-            <a:endParaRPr lang="en-US" sz="8100" dirty="0">
-              <a:solidFill>
-                <a:schemeClr val="bg1"/>
-              </a:solidFill>
-              <a:uFill>
-                <a:solidFill>
-                  <a:srgbClr val="000000"/>
-                </a:solidFill>
-              </a:uFill>
-              <a:latin typeface="+mj-lt"/>
-            </a:endParaRPr>
           </a:p>
         </p:txBody>
       </p:sp>
@@ -2797,19 +2789,7 @@
                 <a:cs typeface="PFDinTextCompPro-Bold"/>
                 <a:sym typeface="PFDinTextCompPro-Bold"/>
               </a:rPr>
-              <a:t>general </a:t>
-            </a:r>
-            <a:r>
-              <a:rPr sz="1600" cap="all" spc="-32" dirty="0">
-                <a:solidFill>
-                  <a:schemeClr val="bg1"/>
-                </a:solidFill>
-                <a:latin typeface="PFDinTextCompPro-Bold"/>
-                <a:ea typeface="PFDinTextCompPro-Bold"/>
-                <a:cs typeface="PFDinTextCompPro-Bold"/>
-                <a:sym typeface="PFDinTextCompPro-Bold"/>
-              </a:rPr>
-              <a:t>assembly</a:t>
+              <a:t>general assembly</a:t>
             </a:r>
           </a:p>
         </p:txBody>
@@ -2825,6 +2805,1440 @@
     <a:masterClrMapping/>
   </p:clrMapOvr>
   <p:transition spd="med"/>
+</p:sld>
+</file>
+
+<file path=ppt/slides/slide10.xml><?xml version="1.0" encoding="utf-8"?>
+<p:sld xmlns:a="http://schemas.openxmlformats.org/drawingml/2006/main" xmlns:r="http://schemas.openxmlformats.org/officeDocument/2006/relationships" xmlns:p="http://schemas.openxmlformats.org/presentationml/2006/main">
+  <p:cSld>
+    <p:spTree>
+      <p:nvGrpSpPr>
+        <p:cNvPr id="1" name=""/>
+        <p:cNvGrpSpPr/>
+        <p:nvPr/>
+      </p:nvGrpSpPr>
+      <p:grpSpPr>
+        <a:xfrm>
+          <a:off x="0" y="0"/>
+          <a:ext cx="0" cy="0"/>
+          <a:chOff x="0" y="0"/>
+          <a:chExt cx="0" cy="0"/>
+        </a:xfrm>
+      </p:grpSpPr>
+      <p:sp>
+        <p:nvSpPr>
+          <p:cNvPr id="114" name="Shape 114"/>
+          <p:cNvSpPr/>
+          <p:nvPr/>
+        </p:nvSpPr>
+        <p:spPr>
+          <a:xfrm>
+            <a:off x="660400" y="7566699"/>
+            <a:ext cx="5727700" cy="145874"/>
+          </a:xfrm>
+          <a:prstGeom prst="rect">
+            <a:avLst/>
+          </a:prstGeom>
+          <a:ln w="12700">
+            <a:miter lim="400000"/>
+          </a:ln>
+          <a:extLst>
+            <a:ext uri="{C572A759-6A51-4108-AA02-DFA0A04FC94B}">
+              <ma14:wrappingTextBoxFlag xmlns:ma14="http://schemas.microsoft.com/office/mac/drawingml/2011/main" xmlns="" val="1"/>
+            </a:ext>
+          </a:extLst>
+        </p:spPr>
+        <p:txBody>
+          <a:bodyPr lIns="0" tIns="0" rIns="0" bIns="0">
+            <a:spAutoFit/>
+          </a:bodyPr>
+          <a:lstStyle>
+            <a:lvl1pPr defTabSz="495300">
+              <a:lnSpc>
+                <a:spcPct val="65000"/>
+              </a:lnSpc>
+              <a:defRPr sz="1400" cap="all" spc="-28">
+                <a:uFillTx/>
+                <a:latin typeface="PFDinTextCompPro-Bold"/>
+                <a:ea typeface="PFDinTextCompPro-Bold"/>
+                <a:cs typeface="PFDinTextCompPro-Bold"/>
+                <a:sym typeface="PFDinTextCompPro-Bold"/>
+              </a:defRPr>
+            </a:lvl1pPr>
+          </a:lstStyle>
+          <a:p>
+            <a:pPr lvl="0">
+              <a:defRPr sz="1800" cap="none" spc="0"/>
+            </a:pPr>
+            <a:r>
+              <a:rPr sz="1400" cap="all" spc="-28" dirty="0"/>
+              <a:t>data </a:t>
+            </a:r>
+            <a:r>
+              <a:rPr sz="1400" cap="all" spc="-28" dirty="0" smtClean="0"/>
+              <a:t>science</a:t>
+            </a:r>
+            <a:endParaRPr sz="1400" cap="all" spc="-28" dirty="0"/>
+          </a:p>
+        </p:txBody>
+      </p:sp>
+      <p:pic>
+        <p:nvPicPr>
+          <p:cNvPr id="115" name="GA_secondary_cog_bw.pdf"/>
+          <p:cNvPicPr/>
+          <p:nvPr/>
+        </p:nvPicPr>
+        <p:blipFill>
+          <a:blip r:embed="rId2">
+            <a:extLst/>
+          </a:blip>
+          <a:stretch>
+            <a:fillRect/>
+          </a:stretch>
+        </p:blipFill>
+        <p:spPr>
+          <a:xfrm>
+            <a:off x="12052300" y="7581900"/>
+            <a:ext cx="332576" cy="330200"/>
+          </a:xfrm>
+          <a:prstGeom prst="rect">
+            <a:avLst/>
+          </a:prstGeom>
+          <a:ln w="12700">
+            <a:miter lim="400000"/>
+          </a:ln>
+        </p:spPr>
+      </p:pic>
+      <p:sp>
+        <p:nvSpPr>
+          <p:cNvPr id="116" name="Shape 116"/>
+          <p:cNvSpPr/>
+          <p:nvPr/>
+        </p:nvSpPr>
+        <p:spPr>
+          <a:xfrm>
+            <a:off x="444500" y="2438399"/>
+            <a:ext cx="11129368" cy="421590"/>
+          </a:xfrm>
+          <a:prstGeom prst="rect">
+            <a:avLst/>
+          </a:prstGeom>
+          <a:ln w="12700">
+            <a:miter lim="400000"/>
+          </a:ln>
+          <a:extLst>
+            <a:ext uri="{C572A759-6A51-4108-AA02-DFA0A04FC94B}">
+              <ma14:wrappingTextBoxFlag xmlns:ma14="http://schemas.microsoft.com/office/mac/drawingml/2011/main" xmlns="" val="1"/>
+            </a:ext>
+          </a:extLst>
+        </p:spPr>
+        <p:txBody>
+          <a:bodyPr lIns="0" tIns="0" rIns="0" bIns="0">
+            <a:spAutoFit/>
+          </a:bodyPr>
+          <a:lstStyle/>
+          <a:p>
+            <a:pPr lvl="0" defTabSz="1524000">
+              <a:lnSpc>
+                <a:spcPct val="110000"/>
+              </a:lnSpc>
+              <a:spcBef>
+                <a:spcPts val="500"/>
+              </a:spcBef>
+              <a:buFont typeface="Lucida Grande"/>
+              <a:defRPr sz="1800">
+                <a:uFillTx/>
+              </a:defRPr>
+            </a:pPr>
+            <a:endParaRPr sz="2700" cap="all" spc="-53" dirty="0">
+              <a:uFill>
+                <a:solidFill/>
+              </a:uFill>
+              <a:latin typeface="Helvetica"/>
+              <a:ea typeface="Helvetica"/>
+              <a:cs typeface="Helvetica"/>
+              <a:sym typeface="Helvetica"/>
+            </a:endParaRPr>
+          </a:p>
+        </p:txBody>
+      </p:sp>
+      <p:sp>
+        <p:nvSpPr>
+          <p:cNvPr id="117" name="Shape 117"/>
+          <p:cNvSpPr/>
+          <p:nvPr/>
+        </p:nvSpPr>
+        <p:spPr>
+          <a:xfrm>
+            <a:off x="637376" y="0"/>
+            <a:ext cx="11747500" cy="687048"/>
+          </a:xfrm>
+          <a:prstGeom prst="rect">
+            <a:avLst/>
+          </a:prstGeom>
+          <a:ln w="12700">
+            <a:miter lim="400000"/>
+          </a:ln>
+          <a:extLst>
+            <a:ext uri="{C572A759-6A51-4108-AA02-DFA0A04FC94B}">
+              <ma14:wrappingTextBoxFlag xmlns:ma14="http://schemas.microsoft.com/office/mac/drawingml/2011/main" xmlns="" val="1"/>
+            </a:ext>
+          </a:extLst>
+        </p:spPr>
+        <p:txBody>
+          <a:bodyPr lIns="0" tIns="0" rIns="0" bIns="0">
+            <a:spAutoFit/>
+          </a:bodyPr>
+          <a:lstStyle>
+            <a:lvl1pPr defTabSz="1524000">
+              <a:lnSpc>
+                <a:spcPct val="110000"/>
+              </a:lnSpc>
+              <a:buFont typeface="Lucida Grande"/>
+              <a:defRPr sz="2000"/>
+            </a:lvl1pPr>
+          </a:lstStyle>
+          <a:p>
+            <a:pPr lvl="0">
+              <a:defRPr sz="1800">
+                <a:uFillTx/>
+              </a:defRPr>
+            </a:pPr>
+            <a:r>
+              <a:rPr lang="en-US" sz="4400" b="1" dirty="0" smtClean="0">
+                <a:uFill>
+                  <a:solidFill/>
+                </a:uFill>
+              </a:rPr>
+              <a:t>Commands</a:t>
+            </a:r>
+            <a:endParaRPr sz="4400" b="1" dirty="0">
+              <a:uFill>
+                <a:solidFill/>
+              </a:uFill>
+            </a:endParaRPr>
+          </a:p>
+        </p:txBody>
+      </p:sp>
+      <p:sp>
+        <p:nvSpPr>
+          <p:cNvPr id="4" name="TextBox 3"/>
+          <p:cNvSpPr txBox="1"/>
+          <p:nvPr/>
+        </p:nvSpPr>
+        <p:spPr>
+          <a:xfrm>
+            <a:off x="540938" y="1083733"/>
+            <a:ext cx="11940376" cy="5486400"/>
+          </a:xfrm>
+          <a:prstGeom prst="rect">
+            <a:avLst/>
+          </a:prstGeom>
+          <a:noFill/>
+          <a:ln w="12700" cap="flat">
+            <a:noFill/>
+            <a:miter lim="400000"/>
+          </a:ln>
+          <a:effectLst/>
+        </p:spPr>
+        <p:style>
+          <a:lnRef idx="0">
+            <a:scrgbClr r="0" g="0" b="0"/>
+          </a:lnRef>
+          <a:fillRef idx="0">
+            <a:scrgbClr r="0" g="0" b="0"/>
+          </a:fillRef>
+          <a:effectRef idx="0">
+            <a:scrgbClr r="0" g="0" b="0"/>
+          </a:effectRef>
+          <a:fontRef idx="none"/>
+        </p:style>
+        <p:txBody>
+          <a:bodyPr rot="0" spcFirstLastPara="1" vertOverflow="overflow" horzOverflow="overflow" vert="horz" wrap="none" lIns="50800" tIns="50800" rIns="50800" bIns="50800" numCol="1" spcCol="38100" rtlCol="0" anchor="ctr">
+            <a:noAutofit/>
+          </a:bodyPr>
+          <a:lstStyle/>
+          <a:p>
+            <a:pPr algn="l" rtl="0" latinLnBrk="1" hangingPunct="0"/>
+            <a:r>
+              <a:rPr lang="en-US" b="1" u="sng" dirty="0" smtClean="0">
+                <a:solidFill>
+                  <a:srgbClr val="000000"/>
+                </a:solidFill>
+                <a:uFill>
+                  <a:solidFill>
+                    <a:srgbClr val="000000"/>
+                  </a:solidFill>
+                </a:uFill>
+              </a:rPr>
+              <a:t>Status</a:t>
+            </a:r>
+            <a:r>
+              <a:rPr lang="en-US" dirty="0" smtClean="0">
+                <a:solidFill>
+                  <a:srgbClr val="000000"/>
+                </a:solidFill>
+                <a:uFill>
+                  <a:solidFill>
+                    <a:srgbClr val="000000"/>
+                  </a:solidFill>
+                </a:uFill>
+              </a:rPr>
+              <a:t>: Status of files (tracked, untracked, modified or not)</a:t>
+            </a:r>
+            <a:endParaRPr lang="en-US" dirty="0">
+              <a:solidFill>
+                <a:srgbClr val="000000"/>
+              </a:solidFill>
+              <a:uFill>
+                <a:solidFill>
+                  <a:srgbClr val="000000"/>
+                </a:solidFill>
+              </a:uFill>
+            </a:endParaRPr>
+          </a:p>
+          <a:p>
+            <a:pPr marL="342900" lvl="8" indent="-342900" algn="l" rtl="0" latinLnBrk="1" hangingPunct="0">
+              <a:buFont typeface="Arial" panose="020B0604020202020204" pitchFamily="34" charset="0"/>
+              <a:buChar char="•"/>
+            </a:pPr>
+            <a:r>
+              <a:rPr lang="en-US" dirty="0" err="1">
+                <a:solidFill>
+                  <a:srgbClr val="000000"/>
+                </a:solidFill>
+                <a:uFill>
+                  <a:solidFill>
+                    <a:srgbClr val="000000"/>
+                  </a:solidFill>
+                </a:uFill>
+              </a:rPr>
+              <a:t>g</a:t>
+            </a:r>
+            <a:r>
+              <a:rPr lang="en-US" dirty="0" err="1" smtClean="0">
+                <a:solidFill>
+                  <a:srgbClr val="000000"/>
+                </a:solidFill>
+                <a:uFill>
+                  <a:solidFill>
+                    <a:srgbClr val="000000"/>
+                  </a:solidFill>
+                </a:uFill>
+              </a:rPr>
+              <a:t>it</a:t>
+            </a:r>
+            <a:r>
+              <a:rPr lang="en-US" dirty="0" smtClean="0">
+                <a:solidFill>
+                  <a:srgbClr val="000000"/>
+                </a:solidFill>
+                <a:uFill>
+                  <a:solidFill>
+                    <a:srgbClr val="000000"/>
+                  </a:solidFill>
+                </a:uFill>
+              </a:rPr>
+              <a:t> status</a:t>
+            </a:r>
+            <a:endParaRPr lang="en-US" b="1" u="sng" dirty="0" smtClean="0">
+              <a:solidFill>
+                <a:srgbClr val="000000"/>
+              </a:solidFill>
+              <a:uFill>
+                <a:solidFill>
+                  <a:srgbClr val="000000"/>
+                </a:solidFill>
+              </a:uFill>
+            </a:endParaRPr>
+          </a:p>
+          <a:p>
+            <a:pPr marR="0" algn="l" defTabSz="1435100" rtl="0" fontAlgn="auto" latinLnBrk="1" hangingPunct="0">
+              <a:lnSpc>
+                <a:spcPct val="100000"/>
+              </a:lnSpc>
+              <a:spcBef>
+                <a:spcPts val="0"/>
+              </a:spcBef>
+              <a:spcAft>
+                <a:spcPts val="0"/>
+              </a:spcAft>
+              <a:buClrTx/>
+              <a:buSzTx/>
+              <a:tabLst/>
+            </a:pPr>
+            <a:r>
+              <a:rPr lang="en-US" b="1" u="sng" dirty="0" smtClean="0">
+                <a:solidFill>
+                  <a:srgbClr val="000000"/>
+                </a:solidFill>
+                <a:uFill>
+                  <a:solidFill>
+                    <a:srgbClr val="000000"/>
+                  </a:solidFill>
+                </a:uFill>
+              </a:rPr>
+              <a:t>Staging</a:t>
+            </a:r>
+            <a:r>
+              <a:rPr kumimoji="0" lang="en-US" sz="2200" b="0" i="0" u="none" strike="noStrike" cap="none" spc="0" normalizeH="0" baseline="0" dirty="0" smtClean="0">
+                <a:ln>
+                  <a:noFill/>
+                </a:ln>
+                <a:solidFill>
+                  <a:srgbClr val="000000"/>
+                </a:solidFill>
+                <a:effectLst/>
+                <a:uFill>
+                  <a:solidFill>
+                    <a:srgbClr val="000000"/>
+                  </a:solidFill>
+                </a:uFill>
+                <a:latin typeface="+mn-lt"/>
+                <a:ea typeface="+mn-ea"/>
+                <a:cs typeface="+mn-cs"/>
+                <a:sym typeface="News706BT-RomanC"/>
+              </a:rPr>
+              <a:t>: Prepping</a:t>
+            </a:r>
+            <a:r>
+              <a:rPr kumimoji="0" lang="en-US" sz="2200" b="0" i="0" u="none" strike="noStrike" cap="none" spc="0" normalizeH="0" dirty="0" smtClean="0">
+                <a:ln>
+                  <a:noFill/>
+                </a:ln>
+                <a:solidFill>
+                  <a:srgbClr val="000000"/>
+                </a:solidFill>
+                <a:effectLst/>
+                <a:uFill>
+                  <a:solidFill>
+                    <a:srgbClr val="000000"/>
+                  </a:solidFill>
+                </a:uFill>
+                <a:latin typeface="+mn-lt"/>
+                <a:ea typeface="+mn-ea"/>
+                <a:cs typeface="+mn-cs"/>
+                <a:sym typeface="News706BT-RomanC"/>
+              </a:rPr>
+              <a:t> files for committing</a:t>
+            </a:r>
+            <a:r>
+              <a:rPr kumimoji="0" lang="en-US" sz="2200" b="0" i="0" u="none" strike="noStrike" cap="none" spc="0" normalizeH="0" baseline="0" dirty="0" smtClean="0">
+                <a:ln>
+                  <a:noFill/>
+                </a:ln>
+                <a:solidFill>
+                  <a:srgbClr val="000000"/>
+                </a:solidFill>
+                <a:effectLst/>
+                <a:uFill>
+                  <a:solidFill>
+                    <a:srgbClr val="000000"/>
+                  </a:solidFill>
+                </a:uFill>
+                <a:latin typeface="+mn-lt"/>
+                <a:ea typeface="+mn-ea"/>
+                <a:cs typeface="+mn-cs"/>
+                <a:sym typeface="News706BT-RomanC"/>
+              </a:rPr>
+              <a:t>. </a:t>
+            </a:r>
+          </a:p>
+          <a:p>
+            <a:pPr marL="342900" lvl="8" indent="-342900" algn="l" rtl="0" latinLnBrk="1" hangingPunct="0">
+              <a:buFont typeface="Arial" panose="020B0604020202020204" pitchFamily="34" charset="0"/>
+              <a:buChar char="•"/>
+            </a:pPr>
+            <a:r>
+              <a:rPr lang="en-US" dirty="0" err="1">
+                <a:solidFill>
+                  <a:srgbClr val="000000"/>
+                </a:solidFill>
+                <a:uFill>
+                  <a:solidFill>
+                    <a:srgbClr val="000000"/>
+                  </a:solidFill>
+                </a:uFill>
+              </a:rPr>
+              <a:t>g</a:t>
+            </a:r>
+            <a:r>
+              <a:rPr lang="en-US" dirty="0" err="1" smtClean="0">
+                <a:solidFill>
+                  <a:srgbClr val="000000"/>
+                </a:solidFill>
+                <a:uFill>
+                  <a:solidFill>
+                    <a:srgbClr val="000000"/>
+                  </a:solidFill>
+                </a:uFill>
+              </a:rPr>
+              <a:t>it</a:t>
+            </a:r>
+            <a:r>
+              <a:rPr lang="en-US" dirty="0" smtClean="0">
+                <a:solidFill>
+                  <a:srgbClr val="000000"/>
+                </a:solidFill>
+                <a:uFill>
+                  <a:solidFill>
+                    <a:srgbClr val="000000"/>
+                  </a:solidFill>
+                </a:uFill>
+              </a:rPr>
+              <a:t> add filename</a:t>
+            </a:r>
+          </a:p>
+          <a:p>
+            <a:pPr marL="342900" lvl="8" indent="-342900" algn="l" rtl="0" latinLnBrk="1" hangingPunct="0">
+              <a:buFont typeface="Arial" panose="020B0604020202020204" pitchFamily="34" charset="0"/>
+              <a:buChar char="•"/>
+            </a:pPr>
+            <a:r>
+              <a:rPr lang="en-US" dirty="0" err="1">
+                <a:solidFill>
+                  <a:srgbClr val="000000"/>
+                </a:solidFill>
+                <a:uFill>
+                  <a:solidFill>
+                    <a:srgbClr val="000000"/>
+                  </a:solidFill>
+                </a:uFill>
+              </a:rPr>
+              <a:t>g</a:t>
+            </a:r>
+            <a:r>
+              <a:rPr kumimoji="0" lang="en-US" b="0" i="0" u="none" strike="noStrike" cap="none" spc="0" normalizeH="0" baseline="0" dirty="0" err="1" smtClean="0">
+                <a:ln>
+                  <a:noFill/>
+                </a:ln>
+                <a:solidFill>
+                  <a:srgbClr val="000000"/>
+                </a:solidFill>
+                <a:effectLst/>
+                <a:uFill>
+                  <a:solidFill>
+                    <a:srgbClr val="000000"/>
+                  </a:solidFill>
+                </a:uFill>
+                <a:latin typeface="+mn-lt"/>
+                <a:ea typeface="+mn-ea"/>
+                <a:cs typeface="+mn-cs"/>
+                <a:sym typeface="News706BT-RomanC"/>
+              </a:rPr>
+              <a:t>it</a:t>
+            </a:r>
+            <a:r>
+              <a:rPr kumimoji="0" lang="en-US" b="0" i="0" u="none" strike="noStrike" cap="none" spc="0" normalizeH="0" baseline="0" dirty="0" smtClean="0">
+                <a:ln>
+                  <a:noFill/>
+                </a:ln>
+                <a:solidFill>
+                  <a:srgbClr val="000000"/>
+                </a:solidFill>
+                <a:effectLst/>
+                <a:uFill>
+                  <a:solidFill>
+                    <a:srgbClr val="000000"/>
+                  </a:solidFill>
+                </a:uFill>
+                <a:latin typeface="+mn-lt"/>
+                <a:ea typeface="+mn-ea"/>
+                <a:cs typeface="+mn-cs"/>
+                <a:sym typeface="News706BT-RomanC"/>
+              </a:rPr>
+              <a:t> add .</a:t>
+            </a:r>
+          </a:p>
+          <a:p>
+            <a:pPr lvl="8" indent="0" algn="l" rtl="0" latinLnBrk="1" hangingPunct="0"/>
+            <a:r>
+              <a:rPr kumimoji="0" lang="en-US" b="1" i="0" u="sng" strike="noStrike" cap="none" spc="0" normalizeH="0" baseline="0" dirty="0" err="1" smtClean="0">
+                <a:ln>
+                  <a:noFill/>
+                </a:ln>
+                <a:solidFill>
+                  <a:srgbClr val="000000"/>
+                </a:solidFill>
+                <a:effectLst/>
+                <a:uFill>
+                  <a:solidFill>
+                    <a:srgbClr val="000000"/>
+                  </a:solidFill>
+                </a:uFill>
+                <a:latin typeface="+mn-lt"/>
+                <a:ea typeface="+mn-ea"/>
+                <a:cs typeface="+mn-cs"/>
+                <a:sym typeface="News706BT-RomanC"/>
+              </a:rPr>
+              <a:t>Commiting</a:t>
+            </a:r>
+            <a:r>
+              <a:rPr kumimoji="0" lang="en-US" b="1" i="0" u="sng" strike="noStrike" cap="none" spc="0" normalizeH="0" baseline="0" dirty="0" smtClean="0">
+                <a:ln>
+                  <a:noFill/>
+                </a:ln>
+                <a:solidFill>
+                  <a:srgbClr val="000000"/>
+                </a:solidFill>
+                <a:effectLst/>
+                <a:uFill>
+                  <a:solidFill>
+                    <a:srgbClr val="000000"/>
+                  </a:solidFill>
+                </a:uFill>
+                <a:latin typeface="+mn-lt"/>
+                <a:ea typeface="+mn-ea"/>
+                <a:cs typeface="+mn-cs"/>
+                <a:sym typeface="News706BT-RomanC"/>
+              </a:rPr>
+              <a:t>:</a:t>
+            </a:r>
+            <a:r>
+              <a:rPr lang="en-US" dirty="0">
+                <a:solidFill>
+                  <a:srgbClr val="000000"/>
+                </a:solidFill>
+                <a:uFill>
+                  <a:solidFill>
+                    <a:srgbClr val="000000"/>
+                  </a:solidFill>
+                </a:uFill>
+              </a:rPr>
+              <a:t> </a:t>
+            </a:r>
+            <a:r>
+              <a:rPr lang="en-US" dirty="0" smtClean="0">
+                <a:solidFill>
+                  <a:srgbClr val="000000"/>
+                </a:solidFill>
+                <a:uFill>
+                  <a:solidFill>
+                    <a:srgbClr val="000000"/>
+                  </a:solidFill>
+                </a:uFill>
+              </a:rPr>
+              <a:t>Committing the changes to </a:t>
+            </a:r>
+            <a:r>
+              <a:rPr lang="en-US" dirty="0" err="1" smtClean="0">
+                <a:solidFill>
+                  <a:srgbClr val="000000"/>
+                </a:solidFill>
+                <a:uFill>
+                  <a:solidFill>
+                    <a:srgbClr val="000000"/>
+                  </a:solidFill>
+                </a:uFill>
+              </a:rPr>
+              <a:t>Git</a:t>
+            </a:r>
+            <a:endParaRPr kumimoji="0" lang="en-US" i="0" strike="noStrike" cap="none" spc="0" normalizeH="0" dirty="0" smtClean="0">
+              <a:ln>
+                <a:noFill/>
+              </a:ln>
+              <a:solidFill>
+                <a:srgbClr val="000000"/>
+              </a:solidFill>
+              <a:effectLst/>
+              <a:uFill>
+                <a:solidFill>
+                  <a:srgbClr val="000000"/>
+                </a:solidFill>
+              </a:uFill>
+              <a:latin typeface="+mn-lt"/>
+              <a:ea typeface="+mn-ea"/>
+              <a:cs typeface="+mn-cs"/>
+              <a:sym typeface="News706BT-RomanC"/>
+            </a:endParaRPr>
+          </a:p>
+          <a:p>
+            <a:pPr marL="342900" lvl="8" indent="-342900" algn="l" rtl="0" latinLnBrk="1" hangingPunct="0">
+              <a:buFont typeface="Arial" panose="020B0604020202020204" pitchFamily="34" charset="0"/>
+              <a:buChar char="•"/>
+            </a:pPr>
+            <a:r>
+              <a:rPr lang="en-US" dirty="0" err="1">
+                <a:solidFill>
+                  <a:srgbClr val="000000"/>
+                </a:solidFill>
+                <a:uFill>
+                  <a:solidFill>
+                    <a:srgbClr val="000000"/>
+                  </a:solidFill>
+                </a:uFill>
+              </a:rPr>
+              <a:t>g</a:t>
+            </a:r>
+            <a:r>
+              <a:rPr lang="en-US" baseline="0" dirty="0" err="1" smtClean="0">
+                <a:solidFill>
+                  <a:srgbClr val="000000"/>
+                </a:solidFill>
+                <a:uFill>
+                  <a:solidFill>
+                    <a:srgbClr val="000000"/>
+                  </a:solidFill>
+                </a:uFill>
+              </a:rPr>
+              <a:t>it</a:t>
+            </a:r>
+            <a:r>
+              <a:rPr lang="en-US" dirty="0" smtClean="0">
+                <a:solidFill>
+                  <a:srgbClr val="000000"/>
+                </a:solidFill>
+                <a:uFill>
+                  <a:solidFill>
+                    <a:srgbClr val="000000"/>
+                  </a:solidFill>
+                </a:uFill>
+              </a:rPr>
+              <a:t> commit –m “Comment for the commit”</a:t>
+            </a:r>
+          </a:p>
+          <a:p>
+            <a:pPr lvl="8" indent="0" algn="l" rtl="0" latinLnBrk="1" hangingPunct="0"/>
+            <a:r>
+              <a:rPr kumimoji="0" lang="en-US" b="1" i="0" u="sng" strike="noStrike" cap="none" spc="0" normalizeH="0" baseline="0" dirty="0" smtClean="0">
+                <a:ln>
+                  <a:noFill/>
+                </a:ln>
+                <a:solidFill>
+                  <a:srgbClr val="000000"/>
+                </a:solidFill>
+                <a:effectLst/>
+                <a:uFill>
+                  <a:solidFill>
+                    <a:srgbClr val="000000"/>
+                  </a:solidFill>
+                </a:uFill>
+                <a:latin typeface="+mn-lt"/>
+                <a:ea typeface="+mn-ea"/>
+                <a:cs typeface="+mn-cs"/>
+                <a:sym typeface="News706BT-RomanC"/>
+              </a:rPr>
+              <a:t>Log:</a:t>
+            </a:r>
+            <a:r>
+              <a:rPr lang="en-US" dirty="0">
+                <a:solidFill>
+                  <a:srgbClr val="000000"/>
+                </a:solidFill>
+                <a:uFill>
+                  <a:solidFill>
+                    <a:srgbClr val="000000"/>
+                  </a:solidFill>
+                </a:uFill>
+              </a:rPr>
+              <a:t> </a:t>
+            </a:r>
+            <a:r>
+              <a:rPr lang="en-US" dirty="0" smtClean="0">
+                <a:solidFill>
+                  <a:srgbClr val="000000"/>
+                </a:solidFill>
+                <a:uFill>
+                  <a:solidFill>
+                    <a:srgbClr val="000000"/>
+                  </a:solidFill>
+                </a:uFill>
+              </a:rPr>
+              <a:t>Log of changes</a:t>
+            </a:r>
+          </a:p>
+          <a:p>
+            <a:pPr marL="342900" lvl="8" indent="-342900" algn="l" rtl="0" latinLnBrk="1" hangingPunct="0">
+              <a:buFont typeface="Arial" panose="020B0604020202020204" pitchFamily="34" charset="0"/>
+              <a:buChar char="•"/>
+            </a:pPr>
+            <a:r>
+              <a:rPr lang="en-US" dirty="0" err="1">
+                <a:solidFill>
+                  <a:srgbClr val="000000"/>
+                </a:solidFill>
+                <a:uFill>
+                  <a:solidFill>
+                    <a:srgbClr val="000000"/>
+                  </a:solidFill>
+                </a:uFill>
+              </a:rPr>
+              <a:t>g</a:t>
+            </a:r>
+            <a:r>
+              <a:rPr kumimoji="0" lang="en-US" i="0" strike="noStrike" cap="none" spc="0" normalizeH="0" baseline="0" dirty="0" err="1" smtClean="0">
+                <a:ln>
+                  <a:noFill/>
+                </a:ln>
+                <a:solidFill>
+                  <a:srgbClr val="000000"/>
+                </a:solidFill>
+                <a:effectLst/>
+                <a:uFill>
+                  <a:solidFill>
+                    <a:srgbClr val="000000"/>
+                  </a:solidFill>
+                </a:uFill>
+                <a:latin typeface="+mn-lt"/>
+                <a:ea typeface="+mn-ea"/>
+                <a:cs typeface="+mn-cs"/>
+                <a:sym typeface="News706BT-RomanC"/>
+              </a:rPr>
+              <a:t>it</a:t>
+            </a:r>
+            <a:r>
+              <a:rPr kumimoji="0" lang="en-US" i="0" strike="noStrike" cap="none" spc="0" normalizeH="0" dirty="0" smtClean="0">
+                <a:ln>
+                  <a:noFill/>
+                </a:ln>
+                <a:solidFill>
+                  <a:srgbClr val="000000"/>
+                </a:solidFill>
+                <a:effectLst/>
+                <a:uFill>
+                  <a:solidFill>
+                    <a:srgbClr val="000000"/>
+                  </a:solidFill>
+                </a:uFill>
+                <a:latin typeface="+mn-lt"/>
+                <a:ea typeface="+mn-ea"/>
+                <a:cs typeface="+mn-cs"/>
+                <a:sym typeface="News706BT-RomanC"/>
+              </a:rPr>
+              <a:t> log</a:t>
+            </a:r>
+          </a:p>
+          <a:p>
+            <a:pPr lvl="8" indent="0" algn="l" rtl="0" latinLnBrk="1" hangingPunct="0"/>
+            <a:r>
+              <a:rPr lang="en-US" b="1" u="sng" baseline="0" dirty="0" smtClean="0">
+                <a:solidFill>
+                  <a:srgbClr val="000000"/>
+                </a:solidFill>
+                <a:uFill>
+                  <a:solidFill>
+                    <a:srgbClr val="000000"/>
+                  </a:solidFill>
+                </a:uFill>
+              </a:rPr>
+              <a:t>Push:</a:t>
+            </a:r>
+            <a:r>
+              <a:rPr lang="en-US" baseline="0" dirty="0" smtClean="0">
+                <a:solidFill>
+                  <a:srgbClr val="000000"/>
+                </a:solidFill>
+                <a:uFill>
+                  <a:solidFill>
+                    <a:srgbClr val="000000"/>
+                  </a:solidFill>
+                </a:uFill>
+              </a:rPr>
+              <a:t> Push</a:t>
+            </a:r>
+            <a:r>
+              <a:rPr lang="en-US" dirty="0" smtClean="0">
+                <a:solidFill>
+                  <a:srgbClr val="000000"/>
+                </a:solidFill>
+                <a:uFill>
+                  <a:solidFill>
+                    <a:srgbClr val="000000"/>
+                  </a:solidFill>
+                </a:uFill>
+              </a:rPr>
+              <a:t> the changes to the GitHub repo</a:t>
+            </a:r>
+          </a:p>
+          <a:p>
+            <a:pPr marL="342900" lvl="8" indent="-342900" algn="l" rtl="0" latinLnBrk="1" hangingPunct="0">
+              <a:buFont typeface="Arial" panose="020B0604020202020204" pitchFamily="34" charset="0"/>
+              <a:buChar char="•"/>
+            </a:pPr>
+            <a:r>
+              <a:rPr lang="en-US" dirty="0" err="1">
+                <a:solidFill>
+                  <a:srgbClr val="000000"/>
+                </a:solidFill>
+                <a:uFill>
+                  <a:solidFill>
+                    <a:srgbClr val="000000"/>
+                  </a:solidFill>
+                </a:uFill>
+              </a:rPr>
+              <a:t>g</a:t>
+            </a:r>
+            <a:r>
+              <a:rPr kumimoji="0" lang="en-US" i="0" strike="noStrike" cap="none" spc="0" normalizeH="0" baseline="0" dirty="0" err="1" smtClean="0">
+                <a:ln>
+                  <a:noFill/>
+                </a:ln>
+                <a:solidFill>
+                  <a:srgbClr val="000000"/>
+                </a:solidFill>
+                <a:effectLst/>
+                <a:uFill>
+                  <a:solidFill>
+                    <a:srgbClr val="000000"/>
+                  </a:solidFill>
+                </a:uFill>
+                <a:latin typeface="+mn-lt"/>
+                <a:ea typeface="+mn-ea"/>
+                <a:cs typeface="+mn-cs"/>
+                <a:sym typeface="News706BT-RomanC"/>
+              </a:rPr>
+              <a:t>it</a:t>
+            </a:r>
+            <a:r>
+              <a:rPr kumimoji="0" lang="en-US" i="0" strike="noStrike" cap="none" spc="0" normalizeH="0" dirty="0" smtClean="0">
+                <a:ln>
+                  <a:noFill/>
+                </a:ln>
+                <a:solidFill>
+                  <a:srgbClr val="000000"/>
+                </a:solidFill>
+                <a:effectLst/>
+                <a:uFill>
+                  <a:solidFill>
+                    <a:srgbClr val="000000"/>
+                  </a:solidFill>
+                </a:uFill>
+                <a:latin typeface="+mn-lt"/>
+                <a:ea typeface="+mn-ea"/>
+                <a:cs typeface="+mn-cs"/>
+                <a:sym typeface="News706BT-RomanC"/>
+              </a:rPr>
+              <a:t> push origin master</a:t>
+            </a:r>
+          </a:p>
+          <a:p>
+            <a:pPr marL="342900" lvl="8" indent="-342900" algn="l" rtl="0" latinLnBrk="1" hangingPunct="0">
+              <a:buFont typeface="Arial" panose="020B0604020202020204" pitchFamily="34" charset="0"/>
+              <a:buChar char="•"/>
+            </a:pPr>
+            <a:r>
+              <a:rPr lang="en-US" baseline="0" dirty="0" smtClean="0">
+                <a:solidFill>
+                  <a:srgbClr val="000000"/>
+                </a:solidFill>
+                <a:uFill>
+                  <a:solidFill>
+                    <a:srgbClr val="000000"/>
+                  </a:solidFill>
+                </a:uFill>
+              </a:rPr>
+              <a:t>Push master branch to the origin remote</a:t>
+            </a:r>
+          </a:p>
+          <a:p>
+            <a:pPr marL="342900" lvl="8" indent="-342900" algn="l" rtl="0" latinLnBrk="1" hangingPunct="0">
+              <a:buFont typeface="Arial" panose="020B0604020202020204" pitchFamily="34" charset="0"/>
+              <a:buChar char="•"/>
+            </a:pPr>
+            <a:r>
+              <a:rPr kumimoji="0" lang="en-US" i="0" strike="noStrike" cap="none" spc="0" normalizeH="0" dirty="0" smtClean="0">
+                <a:ln>
+                  <a:noFill/>
+                </a:ln>
+                <a:solidFill>
+                  <a:srgbClr val="000000"/>
+                </a:solidFill>
+                <a:effectLst/>
+                <a:uFill>
+                  <a:solidFill>
+                    <a:srgbClr val="000000"/>
+                  </a:solidFill>
+                </a:uFill>
+                <a:latin typeface="+mn-lt"/>
+                <a:ea typeface="+mn-ea"/>
+                <a:cs typeface="+mn-cs"/>
+                <a:sym typeface="News706BT-RomanC"/>
+              </a:rPr>
+              <a:t>Type password and you’re done</a:t>
+            </a:r>
+            <a:endParaRPr kumimoji="0" lang="en-US" i="0" strike="noStrike" cap="none" spc="0" normalizeH="0" baseline="0" dirty="0">
+              <a:ln>
+                <a:noFill/>
+              </a:ln>
+              <a:solidFill>
+                <a:srgbClr val="000000"/>
+              </a:solidFill>
+              <a:effectLst/>
+              <a:uFill>
+                <a:solidFill>
+                  <a:srgbClr val="000000"/>
+                </a:solidFill>
+              </a:uFill>
+              <a:latin typeface="+mn-lt"/>
+              <a:ea typeface="+mn-ea"/>
+              <a:cs typeface="+mn-cs"/>
+              <a:sym typeface="News706BT-RomanC"/>
+            </a:endParaRPr>
+          </a:p>
+        </p:txBody>
+      </p:sp>
+    </p:spTree>
+    <p:extLst>
+      <p:ext uri="{BB962C8B-B14F-4D97-AF65-F5344CB8AC3E}">
+        <p14:creationId xmlns:p14="http://schemas.microsoft.com/office/powerpoint/2010/main" val="1720275955"/>
+      </p:ext>
+    </p:extLst>
+  </p:cSld>
+  <p:clrMapOvr>
+    <a:masterClrMapping/>
+  </p:clrMapOvr>
+  <p:transition spd="med"/>
+  <p:timing>
+    <p:tnLst>
+      <p:par>
+        <p:cTn id="1" dur="indefinite" restart="never" nodeType="tmRoot"/>
+      </p:par>
+    </p:tnLst>
+  </p:timing>
+</p:sld>
+</file>
+
+<file path=ppt/slides/slide11.xml><?xml version="1.0" encoding="utf-8"?>
+<p:sld xmlns:a="http://schemas.openxmlformats.org/drawingml/2006/main" xmlns:r="http://schemas.openxmlformats.org/officeDocument/2006/relationships" xmlns:p="http://schemas.openxmlformats.org/presentationml/2006/main">
+  <p:cSld>
+    <p:spTree>
+      <p:nvGrpSpPr>
+        <p:cNvPr id="1" name=""/>
+        <p:cNvGrpSpPr/>
+        <p:nvPr/>
+      </p:nvGrpSpPr>
+      <p:grpSpPr>
+        <a:xfrm>
+          <a:off x="0" y="0"/>
+          <a:ext cx="0" cy="0"/>
+          <a:chOff x="0" y="0"/>
+          <a:chExt cx="0" cy="0"/>
+        </a:xfrm>
+      </p:grpSpPr>
+      <p:sp>
+        <p:nvSpPr>
+          <p:cNvPr id="114" name="Shape 114"/>
+          <p:cNvSpPr/>
+          <p:nvPr/>
+        </p:nvSpPr>
+        <p:spPr>
+          <a:xfrm>
+            <a:off x="660400" y="7566699"/>
+            <a:ext cx="5727700" cy="145874"/>
+          </a:xfrm>
+          <a:prstGeom prst="rect">
+            <a:avLst/>
+          </a:prstGeom>
+          <a:ln w="12700">
+            <a:miter lim="400000"/>
+          </a:ln>
+          <a:extLst>
+            <a:ext uri="{C572A759-6A51-4108-AA02-DFA0A04FC94B}">
+              <ma14:wrappingTextBoxFlag xmlns:ma14="http://schemas.microsoft.com/office/mac/drawingml/2011/main" xmlns="" val="1"/>
+            </a:ext>
+          </a:extLst>
+        </p:spPr>
+        <p:txBody>
+          <a:bodyPr lIns="0" tIns="0" rIns="0" bIns="0">
+            <a:spAutoFit/>
+          </a:bodyPr>
+          <a:lstStyle>
+            <a:lvl1pPr defTabSz="495300">
+              <a:lnSpc>
+                <a:spcPct val="65000"/>
+              </a:lnSpc>
+              <a:defRPr sz="1400" cap="all" spc="-28">
+                <a:uFillTx/>
+                <a:latin typeface="PFDinTextCompPro-Bold"/>
+                <a:ea typeface="PFDinTextCompPro-Bold"/>
+                <a:cs typeface="PFDinTextCompPro-Bold"/>
+                <a:sym typeface="PFDinTextCompPro-Bold"/>
+              </a:defRPr>
+            </a:lvl1pPr>
+          </a:lstStyle>
+          <a:p>
+            <a:pPr lvl="0">
+              <a:defRPr sz="1800" cap="none" spc="0"/>
+            </a:pPr>
+            <a:r>
+              <a:rPr sz="1400" cap="all" spc="-28" dirty="0"/>
+              <a:t>data </a:t>
+            </a:r>
+            <a:r>
+              <a:rPr sz="1400" cap="all" spc="-28" dirty="0" smtClean="0"/>
+              <a:t>science</a:t>
+            </a:r>
+            <a:endParaRPr sz="1400" cap="all" spc="-28" dirty="0"/>
+          </a:p>
+        </p:txBody>
+      </p:sp>
+      <p:pic>
+        <p:nvPicPr>
+          <p:cNvPr id="115" name="GA_secondary_cog_bw.pdf"/>
+          <p:cNvPicPr/>
+          <p:nvPr/>
+        </p:nvPicPr>
+        <p:blipFill>
+          <a:blip r:embed="rId2">
+            <a:extLst/>
+          </a:blip>
+          <a:stretch>
+            <a:fillRect/>
+          </a:stretch>
+        </p:blipFill>
+        <p:spPr>
+          <a:xfrm>
+            <a:off x="12052300" y="7581900"/>
+            <a:ext cx="332576" cy="330200"/>
+          </a:xfrm>
+          <a:prstGeom prst="rect">
+            <a:avLst/>
+          </a:prstGeom>
+          <a:ln w="12700">
+            <a:miter lim="400000"/>
+          </a:ln>
+        </p:spPr>
+      </p:pic>
+      <p:sp>
+        <p:nvSpPr>
+          <p:cNvPr id="116" name="Shape 116"/>
+          <p:cNvSpPr/>
+          <p:nvPr/>
+        </p:nvSpPr>
+        <p:spPr>
+          <a:xfrm>
+            <a:off x="444500" y="2438399"/>
+            <a:ext cx="11129368" cy="421590"/>
+          </a:xfrm>
+          <a:prstGeom prst="rect">
+            <a:avLst/>
+          </a:prstGeom>
+          <a:ln w="12700">
+            <a:miter lim="400000"/>
+          </a:ln>
+          <a:extLst>
+            <a:ext uri="{C572A759-6A51-4108-AA02-DFA0A04FC94B}">
+              <ma14:wrappingTextBoxFlag xmlns:ma14="http://schemas.microsoft.com/office/mac/drawingml/2011/main" xmlns="" val="1"/>
+            </a:ext>
+          </a:extLst>
+        </p:spPr>
+        <p:txBody>
+          <a:bodyPr lIns="0" tIns="0" rIns="0" bIns="0">
+            <a:spAutoFit/>
+          </a:bodyPr>
+          <a:lstStyle/>
+          <a:p>
+            <a:pPr lvl="0" defTabSz="1524000">
+              <a:lnSpc>
+                <a:spcPct val="110000"/>
+              </a:lnSpc>
+              <a:spcBef>
+                <a:spcPts val="500"/>
+              </a:spcBef>
+              <a:buFont typeface="Lucida Grande"/>
+              <a:defRPr sz="1800">
+                <a:uFillTx/>
+              </a:defRPr>
+            </a:pPr>
+            <a:endParaRPr sz="2700" cap="all" spc="-53" dirty="0">
+              <a:uFill>
+                <a:solidFill/>
+              </a:uFill>
+              <a:latin typeface="Helvetica"/>
+              <a:ea typeface="Helvetica"/>
+              <a:cs typeface="Helvetica"/>
+              <a:sym typeface="Helvetica"/>
+            </a:endParaRPr>
+          </a:p>
+        </p:txBody>
+      </p:sp>
+      <p:sp>
+        <p:nvSpPr>
+          <p:cNvPr id="117" name="Shape 117"/>
+          <p:cNvSpPr/>
+          <p:nvPr/>
+        </p:nvSpPr>
+        <p:spPr>
+          <a:xfrm>
+            <a:off x="637376" y="0"/>
+            <a:ext cx="11747500" cy="687048"/>
+          </a:xfrm>
+          <a:prstGeom prst="rect">
+            <a:avLst/>
+          </a:prstGeom>
+          <a:ln w="12700">
+            <a:miter lim="400000"/>
+          </a:ln>
+          <a:extLst>
+            <a:ext uri="{C572A759-6A51-4108-AA02-DFA0A04FC94B}">
+              <ma14:wrappingTextBoxFlag xmlns:ma14="http://schemas.microsoft.com/office/mac/drawingml/2011/main" xmlns="" val="1"/>
+            </a:ext>
+          </a:extLst>
+        </p:spPr>
+        <p:txBody>
+          <a:bodyPr lIns="0" tIns="0" rIns="0" bIns="0">
+            <a:spAutoFit/>
+          </a:bodyPr>
+          <a:lstStyle>
+            <a:lvl1pPr defTabSz="1524000">
+              <a:lnSpc>
+                <a:spcPct val="110000"/>
+              </a:lnSpc>
+              <a:buFont typeface="Lucida Grande"/>
+              <a:defRPr sz="2000"/>
+            </a:lvl1pPr>
+          </a:lstStyle>
+          <a:p>
+            <a:pPr lvl="0">
+              <a:defRPr sz="1800">
+                <a:uFillTx/>
+              </a:defRPr>
+            </a:pPr>
+            <a:r>
+              <a:rPr lang="en-US" sz="4400" b="1" dirty="0" smtClean="0">
+                <a:uFill>
+                  <a:solidFill/>
+                </a:uFill>
+              </a:rPr>
+              <a:t>To Do</a:t>
+            </a:r>
+            <a:endParaRPr sz="4400" b="1" dirty="0">
+              <a:uFill>
+                <a:solidFill/>
+              </a:uFill>
+            </a:endParaRPr>
+          </a:p>
+        </p:txBody>
+      </p:sp>
+      <p:sp>
+        <p:nvSpPr>
+          <p:cNvPr id="4" name="TextBox 3"/>
+          <p:cNvSpPr txBox="1"/>
+          <p:nvPr/>
+        </p:nvSpPr>
+        <p:spPr>
+          <a:xfrm>
+            <a:off x="540938" y="1083733"/>
+            <a:ext cx="11940376" cy="5486400"/>
+          </a:xfrm>
+          <a:prstGeom prst="rect">
+            <a:avLst/>
+          </a:prstGeom>
+          <a:noFill/>
+          <a:ln w="12700" cap="flat">
+            <a:noFill/>
+            <a:miter lim="400000"/>
+          </a:ln>
+          <a:effectLst/>
+        </p:spPr>
+        <p:style>
+          <a:lnRef idx="0">
+            <a:scrgbClr r="0" g="0" b="0"/>
+          </a:lnRef>
+          <a:fillRef idx="0">
+            <a:scrgbClr r="0" g="0" b="0"/>
+          </a:fillRef>
+          <a:effectRef idx="0">
+            <a:scrgbClr r="0" g="0" b="0"/>
+          </a:effectRef>
+          <a:fontRef idx="none"/>
+        </p:style>
+        <p:txBody>
+          <a:bodyPr rot="0" spcFirstLastPara="1" vertOverflow="overflow" horzOverflow="overflow" vert="horz" wrap="none" lIns="50800" tIns="50800" rIns="50800" bIns="50800" numCol="1" spcCol="38100" rtlCol="0" anchor="ctr">
+            <a:noAutofit/>
+          </a:bodyPr>
+          <a:lstStyle/>
+          <a:p>
+            <a:pPr marL="342900" indent="-342900" algn="l" rtl="0" latinLnBrk="1" hangingPunct="0">
+              <a:buFont typeface="Arial" panose="020B0604020202020204" pitchFamily="34" charset="0"/>
+              <a:buChar char="•"/>
+            </a:pPr>
+            <a:r>
+              <a:rPr kumimoji="0" lang="en-US" sz="4000" i="0" strike="noStrike" cap="none" spc="0" normalizeH="0" baseline="0" dirty="0" smtClean="0">
+                <a:ln>
+                  <a:noFill/>
+                </a:ln>
+                <a:solidFill>
+                  <a:srgbClr val="000000"/>
+                </a:solidFill>
+                <a:effectLst/>
+                <a:uFill>
+                  <a:solidFill>
+                    <a:srgbClr val="000000"/>
+                  </a:solidFill>
+                </a:uFill>
+                <a:sym typeface="News706BT-RomanC"/>
+              </a:rPr>
+              <a:t>Fork</a:t>
+            </a:r>
+            <a:r>
+              <a:rPr kumimoji="0" lang="en-US" sz="4000" i="0" strike="noStrike" cap="none" spc="0" normalizeH="0" dirty="0" smtClean="0">
+                <a:ln>
+                  <a:noFill/>
+                </a:ln>
+                <a:solidFill>
+                  <a:srgbClr val="000000"/>
+                </a:solidFill>
+                <a:effectLst/>
+                <a:uFill>
+                  <a:solidFill>
+                    <a:srgbClr val="000000"/>
+                  </a:solidFill>
+                </a:uFill>
+                <a:sym typeface="News706BT-RomanC"/>
+              </a:rPr>
+              <a:t> the course repo</a:t>
+            </a:r>
+          </a:p>
+          <a:p>
+            <a:pPr marL="342900" indent="-342900" algn="l" rtl="0" latinLnBrk="1" hangingPunct="0">
+              <a:buFont typeface="Arial" panose="020B0604020202020204" pitchFamily="34" charset="0"/>
+              <a:buChar char="•"/>
+            </a:pPr>
+            <a:r>
+              <a:rPr lang="en-US" sz="4000" baseline="0" dirty="0" smtClean="0">
+                <a:solidFill>
+                  <a:srgbClr val="000000"/>
+                </a:solidFill>
+                <a:uFill>
+                  <a:solidFill>
+                    <a:srgbClr val="000000"/>
+                  </a:solidFill>
+                </a:uFill>
+              </a:rPr>
+              <a:t>Create</a:t>
+            </a:r>
+            <a:r>
+              <a:rPr lang="en-US" sz="4000" dirty="0" smtClean="0">
+                <a:solidFill>
+                  <a:srgbClr val="000000"/>
+                </a:solidFill>
+                <a:uFill>
+                  <a:solidFill>
+                    <a:srgbClr val="000000"/>
+                  </a:solidFill>
+                </a:uFill>
+              </a:rPr>
+              <a:t> a new repo for homework</a:t>
+            </a:r>
+          </a:p>
+          <a:p>
+            <a:pPr marL="342900" indent="-342900" algn="l" rtl="0" latinLnBrk="1" hangingPunct="0">
+              <a:buFont typeface="Arial" panose="020B0604020202020204" pitchFamily="34" charset="0"/>
+              <a:buChar char="•"/>
+            </a:pPr>
+            <a:r>
+              <a:rPr lang="en-US" sz="4000" dirty="0" smtClean="0">
+                <a:solidFill>
+                  <a:srgbClr val="000000"/>
+                </a:solidFill>
+                <a:uFill>
+                  <a:solidFill>
+                    <a:srgbClr val="000000"/>
+                  </a:solidFill>
+                </a:uFill>
+              </a:rPr>
+              <a:t>Clone to local computer</a:t>
+            </a:r>
+          </a:p>
+          <a:p>
+            <a:pPr marL="342900" indent="-342900" algn="l" rtl="0" latinLnBrk="1" hangingPunct="0">
+              <a:buFont typeface="Arial" panose="020B0604020202020204" pitchFamily="34" charset="0"/>
+              <a:buChar char="•"/>
+            </a:pPr>
+            <a:r>
+              <a:rPr lang="en-US" sz="4000" dirty="0" smtClean="0">
+                <a:solidFill>
+                  <a:srgbClr val="000000"/>
+                </a:solidFill>
+                <a:uFill>
+                  <a:solidFill>
+                    <a:srgbClr val="000000"/>
+                  </a:solidFill>
+                </a:uFill>
+              </a:rPr>
+              <a:t>Change README.md in homework</a:t>
+            </a:r>
+          </a:p>
+          <a:p>
+            <a:pPr marL="342900" indent="-342900" algn="l" rtl="0" latinLnBrk="1" hangingPunct="0">
+              <a:buFont typeface="Arial" panose="020B0604020202020204" pitchFamily="34" charset="0"/>
+              <a:buChar char="•"/>
+            </a:pPr>
+            <a:r>
+              <a:rPr lang="en-US" sz="4000" dirty="0" smtClean="0">
+                <a:solidFill>
+                  <a:srgbClr val="000000"/>
+                </a:solidFill>
+                <a:uFill>
+                  <a:solidFill>
+                    <a:srgbClr val="000000"/>
+                  </a:solidFill>
+                </a:uFill>
+              </a:rPr>
+              <a:t>Commit changes</a:t>
+            </a:r>
+          </a:p>
+          <a:p>
+            <a:pPr marL="342900" indent="-342900" algn="l" rtl="0" latinLnBrk="1" hangingPunct="0">
+              <a:buFont typeface="Arial" panose="020B0604020202020204" pitchFamily="34" charset="0"/>
+              <a:buChar char="•"/>
+            </a:pPr>
+            <a:r>
+              <a:rPr lang="en-US" sz="4000" dirty="0" smtClean="0">
+                <a:solidFill>
+                  <a:srgbClr val="000000"/>
+                </a:solidFill>
+                <a:uFill>
+                  <a:solidFill>
+                    <a:srgbClr val="000000"/>
+                  </a:solidFill>
+                </a:uFill>
+              </a:rPr>
+              <a:t>Push to GitHub</a:t>
+            </a:r>
+          </a:p>
+          <a:p>
+            <a:pPr marL="342900" indent="-342900" algn="l" rtl="0" latinLnBrk="1" hangingPunct="0">
+              <a:buFont typeface="Arial" panose="020B0604020202020204" pitchFamily="34" charset="0"/>
+              <a:buChar char="•"/>
+            </a:pPr>
+            <a:endParaRPr kumimoji="0" lang="en-US" sz="4000" i="0" strike="noStrike" cap="none" spc="0" normalizeH="0" baseline="0" dirty="0">
+              <a:ln>
+                <a:noFill/>
+              </a:ln>
+              <a:solidFill>
+                <a:srgbClr val="000000"/>
+              </a:solidFill>
+              <a:effectLst/>
+              <a:uFill>
+                <a:solidFill>
+                  <a:srgbClr val="000000"/>
+                </a:solidFill>
+              </a:uFill>
+              <a:sym typeface="News706BT-RomanC"/>
+            </a:endParaRPr>
+          </a:p>
+        </p:txBody>
+      </p:sp>
+    </p:spTree>
+    <p:extLst>
+      <p:ext uri="{BB962C8B-B14F-4D97-AF65-F5344CB8AC3E}">
+        <p14:creationId xmlns:p14="http://schemas.microsoft.com/office/powerpoint/2010/main" val="3276059286"/>
+      </p:ext>
+    </p:extLst>
+  </p:cSld>
+  <p:clrMapOvr>
+    <a:masterClrMapping/>
+  </p:clrMapOvr>
+  <p:transition spd="med"/>
+  <p:timing>
+    <p:tnLst>
+      <p:par>
+        <p:cTn id="1" dur="indefinite" restart="never" nodeType="tmRoot"/>
+      </p:par>
+    </p:tnLst>
+  </p:timing>
 </p:sld>
 </file>
 
@@ -3048,8 +4462,8 @@
         </p:nvSpPr>
         <p:spPr>
           <a:xfrm>
-            <a:off x="254000" y="1168400"/>
-            <a:ext cx="6819900" cy="5919569"/>
+            <a:off x="254000" y="1491565"/>
+            <a:ext cx="6819900" cy="5273238"/>
           </a:xfrm>
           <a:prstGeom prst="rect">
             <a:avLst/>
@@ -3108,79 +4522,6 @@
               <a:buFont typeface="Wingdings" panose="05000000000000000000" pitchFamily="2" charset="2"/>
               <a:buChar char="§"/>
             </a:pPr>
-            <a:r>
-              <a:rPr kumimoji="0" lang="en-US" sz="2800" b="0" i="0" u="none" strike="noStrike" cap="none" spc="0" normalizeH="0" dirty="0" smtClean="0">
-                <a:ln>
-                  <a:noFill/>
-                </a:ln>
-                <a:solidFill>
-                  <a:srgbClr val="000000"/>
-                </a:solidFill>
-                <a:effectLst/>
-                <a:uFill>
-                  <a:solidFill>
-                    <a:srgbClr val="000000"/>
-                  </a:solidFill>
-                </a:uFill>
-                <a:sym typeface="News706BT-RomanC"/>
-              </a:rPr>
-              <a:t>What is </a:t>
-            </a:r>
-            <a:r>
-              <a:rPr kumimoji="0" lang="en-US" sz="2800" b="0" i="0" u="none" strike="noStrike" cap="none" spc="0" normalizeH="0" dirty="0" err="1" smtClean="0">
-                <a:ln>
-                  <a:noFill/>
-                </a:ln>
-                <a:solidFill>
-                  <a:srgbClr val="000000"/>
-                </a:solidFill>
-                <a:effectLst/>
-                <a:uFill>
-                  <a:solidFill>
-                    <a:srgbClr val="000000"/>
-                  </a:solidFill>
-                </a:uFill>
-                <a:sym typeface="News706BT-RomanC"/>
-              </a:rPr>
-              <a:t>Git</a:t>
-            </a:r>
-            <a:endParaRPr kumimoji="0" lang="en-US" sz="2800" b="0" i="0" u="none" strike="noStrike" cap="none" spc="0" normalizeH="0" dirty="0" smtClean="0">
-              <a:ln>
-                <a:noFill/>
-              </a:ln>
-              <a:solidFill>
-                <a:srgbClr val="000000"/>
-              </a:solidFill>
-              <a:effectLst/>
-              <a:uFill>
-                <a:solidFill>
-                  <a:srgbClr val="000000"/>
-                </a:solidFill>
-              </a:uFill>
-              <a:sym typeface="News706BT-RomanC"/>
-            </a:endParaRPr>
-          </a:p>
-          <a:p>
-            <a:pPr marL="342900" lvl="3" indent="-342900" algn="l" rtl="0" latinLnBrk="1" hangingPunct="0">
-              <a:lnSpc>
-                <a:spcPct val="150000"/>
-              </a:lnSpc>
-              <a:buFont typeface="Wingdings" panose="05000000000000000000" pitchFamily="2" charset="2"/>
-              <a:buChar char="§"/>
-            </a:pPr>
-            <a:r>
-              <a:rPr lang="en-US" sz="2800" dirty="0" smtClean="0">
-                <a:solidFill>
-                  <a:srgbClr val="000000"/>
-                </a:solidFill>
-                <a:uFill>
-                  <a:solidFill>
-                    <a:srgbClr val="000000"/>
-                  </a:solidFill>
-                </a:uFill>
-              </a:rPr>
-              <a:t>What is </a:t>
-            </a:r>
             <a:r>
               <a:rPr lang="en-US" sz="2800" dirty="0" err="1" smtClean="0">
                 <a:solidFill>
@@ -4578,327 +5919,7 @@
       </p:sp>
       <p:sp>
         <p:nvSpPr>
-          <p:cNvPr id="10" name="Content Placeholder 2"/>
-          <p:cNvSpPr txBox="1">
-            <a:spLocks/>
-          </p:cNvSpPr>
-          <p:nvPr/>
-        </p:nvSpPr>
-        <p:spPr>
-          <a:xfrm>
-            <a:off x="305322" y="1075846"/>
-            <a:ext cx="8459788" cy="1479463"/>
-          </a:xfrm>
-          <a:prstGeom prst="rect">
-            <a:avLst/>
-          </a:prstGeom>
-        </p:spPr>
-        <p:txBody>
-          <a:bodyPr/>
-          <a:lstStyle>
-            <a:lvl1pPr marL="203200" indent="-203200" defTabSz="698500">
-              <a:lnSpc>
-                <a:spcPts val="3400"/>
-              </a:lnSpc>
-              <a:buSzPct val="70000"/>
-              <a:buFont typeface="Lucida Grande"/>
-              <a:buChar char="‣"/>
-              <a:defRPr sz="2600">
-                <a:uFill>
-                  <a:solidFill/>
-                </a:uFill>
-                <a:latin typeface="+mn-lt"/>
-                <a:ea typeface="+mn-ea"/>
-                <a:cs typeface="+mn-cs"/>
-                <a:sym typeface="News706BT-RomanC"/>
-              </a:defRPr>
-            </a:lvl1pPr>
-            <a:lvl2pPr marL="406400" indent="-203200" defTabSz="698500">
-              <a:lnSpc>
-                <a:spcPts val="3400"/>
-              </a:lnSpc>
-              <a:buSzPct val="70000"/>
-              <a:buFont typeface="Lucida Grande"/>
-              <a:buChar char="‣"/>
-              <a:defRPr sz="2600">
-                <a:uFill>
-                  <a:solidFill/>
-                </a:uFill>
-                <a:latin typeface="+mn-lt"/>
-                <a:ea typeface="+mn-ea"/>
-                <a:cs typeface="+mn-cs"/>
-                <a:sym typeface="News706BT-RomanC"/>
-              </a:defRPr>
-            </a:lvl2pPr>
-            <a:lvl3pPr marL="609600" indent="-203200" defTabSz="698500">
-              <a:lnSpc>
-                <a:spcPts val="3400"/>
-              </a:lnSpc>
-              <a:buSzPct val="70000"/>
-              <a:buFont typeface="Lucida Grande"/>
-              <a:buChar char="‣"/>
-              <a:defRPr sz="2600">
-                <a:uFill>
-                  <a:solidFill/>
-                </a:uFill>
-                <a:latin typeface="+mn-lt"/>
-                <a:ea typeface="+mn-ea"/>
-                <a:cs typeface="+mn-cs"/>
-                <a:sym typeface="News706BT-RomanC"/>
-              </a:defRPr>
-            </a:lvl3pPr>
-            <a:lvl4pPr marL="812800" indent="-203200" defTabSz="698500">
-              <a:lnSpc>
-                <a:spcPts val="3400"/>
-              </a:lnSpc>
-              <a:buSzPct val="70000"/>
-              <a:buFont typeface="Lucida Grande"/>
-              <a:buChar char="‣"/>
-              <a:defRPr sz="2600">
-                <a:uFill>
-                  <a:solidFill/>
-                </a:uFill>
-                <a:latin typeface="+mn-lt"/>
-                <a:ea typeface="+mn-ea"/>
-                <a:cs typeface="+mn-cs"/>
-                <a:sym typeface="News706BT-RomanC"/>
-              </a:defRPr>
-            </a:lvl4pPr>
-            <a:lvl5pPr marL="1016000" indent="-203200" defTabSz="698500">
-              <a:lnSpc>
-                <a:spcPts val="3400"/>
-              </a:lnSpc>
-              <a:buSzPct val="70000"/>
-              <a:buFont typeface="Lucida Grande"/>
-              <a:buChar char="‣"/>
-              <a:defRPr sz="2600">
-                <a:uFill>
-                  <a:solidFill/>
-                </a:uFill>
-                <a:latin typeface="+mn-lt"/>
-                <a:ea typeface="+mn-ea"/>
-                <a:cs typeface="+mn-cs"/>
-                <a:sym typeface="News706BT-RomanC"/>
-              </a:defRPr>
-            </a:lvl5pPr>
-            <a:lvl6pPr marL="1219200" indent="-203200" defTabSz="698500">
-              <a:lnSpc>
-                <a:spcPts val="3400"/>
-              </a:lnSpc>
-              <a:buSzPct val="70000"/>
-              <a:buFont typeface="Lucida Grande"/>
-              <a:buChar char="‣"/>
-              <a:defRPr sz="2600">
-                <a:uFill>
-                  <a:solidFill/>
-                </a:uFill>
-                <a:latin typeface="+mn-lt"/>
-                <a:ea typeface="+mn-ea"/>
-                <a:cs typeface="+mn-cs"/>
-                <a:sym typeface="News706BT-RomanC"/>
-              </a:defRPr>
-            </a:lvl6pPr>
-            <a:lvl7pPr marL="1422400" indent="-203200" defTabSz="698500">
-              <a:lnSpc>
-                <a:spcPts val="3400"/>
-              </a:lnSpc>
-              <a:buSzPct val="70000"/>
-              <a:buFont typeface="Lucida Grande"/>
-              <a:buChar char="‣"/>
-              <a:defRPr sz="2600">
-                <a:uFill>
-                  <a:solidFill/>
-                </a:uFill>
-                <a:latin typeface="+mn-lt"/>
-                <a:ea typeface="+mn-ea"/>
-                <a:cs typeface="+mn-cs"/>
-                <a:sym typeface="News706BT-RomanC"/>
-              </a:defRPr>
-            </a:lvl7pPr>
-            <a:lvl8pPr marL="1625600" indent="-203200" defTabSz="698500">
-              <a:lnSpc>
-                <a:spcPts val="3400"/>
-              </a:lnSpc>
-              <a:buSzPct val="70000"/>
-              <a:buFont typeface="Lucida Grande"/>
-              <a:buChar char="‣"/>
-              <a:defRPr sz="2600">
-                <a:uFill>
-                  <a:solidFill/>
-                </a:uFill>
-                <a:latin typeface="+mn-lt"/>
-                <a:ea typeface="+mn-ea"/>
-                <a:cs typeface="+mn-cs"/>
-                <a:sym typeface="News706BT-RomanC"/>
-              </a:defRPr>
-            </a:lvl8pPr>
-            <a:lvl9pPr marL="1828800" indent="-203200" defTabSz="698500">
-              <a:lnSpc>
-                <a:spcPts val="3400"/>
-              </a:lnSpc>
-              <a:buSzPct val="70000"/>
-              <a:buFont typeface="Lucida Grande"/>
-              <a:buChar char="‣"/>
-              <a:defRPr sz="2600">
-                <a:uFill>
-                  <a:solidFill/>
-                </a:uFill>
-                <a:latin typeface="+mn-lt"/>
-                <a:ea typeface="+mn-ea"/>
-                <a:cs typeface="+mn-cs"/>
-                <a:sym typeface="News706BT-RomanC"/>
-              </a:defRPr>
-            </a:lvl9pPr>
-          </a:lstStyle>
-          <a:p>
-            <a:pPr marL="457200" indent="-457200">
-              <a:buFont typeface="Arial" panose="020B0604020202020204" pitchFamily="34" charset="0"/>
-              <a:buChar char="•"/>
-            </a:pPr>
-            <a:r>
-              <a:rPr lang="en-US" sz="2000" dirty="0" smtClean="0"/>
-              <a:t>Committed: Data stored in local database</a:t>
-            </a:r>
-          </a:p>
-          <a:p>
-            <a:pPr marL="457200" indent="-457200">
-              <a:buFont typeface="Arial" panose="020B0604020202020204" pitchFamily="34" charset="0"/>
-              <a:buChar char="•"/>
-            </a:pPr>
-            <a:r>
-              <a:rPr lang="en-US" sz="2000" dirty="0" smtClean="0"/>
-              <a:t>Modified: Changed but not committed yet</a:t>
-            </a:r>
-          </a:p>
-          <a:p>
-            <a:pPr marL="457200" indent="-457200">
-              <a:buFont typeface="Arial" panose="020B0604020202020204" pitchFamily="34" charset="0"/>
-              <a:buChar char="•"/>
-            </a:pPr>
-            <a:r>
-              <a:rPr lang="en-US" sz="2000" dirty="0" smtClean="0"/>
-              <a:t>Staged: Marked in its current version to go into next commit</a:t>
-            </a:r>
-            <a:endParaRPr lang="en-US" sz="2000" dirty="0"/>
-          </a:p>
-        </p:txBody>
-      </p:sp>
-      <p:pic>
-        <p:nvPicPr>
-          <p:cNvPr id="11" name="Picture 2" descr="Working directory, staging area, and Git directory."/>
-          <p:cNvPicPr>
-            <a:picLocks noChangeAspect="1" noChangeArrowheads="1"/>
-          </p:cNvPicPr>
-          <p:nvPr/>
-        </p:nvPicPr>
-        <p:blipFill>
-          <a:blip r:embed="rId3">
-            <a:extLst>
-              <a:ext uri="{28A0092B-C50C-407E-A947-70E740481C1C}">
-                <a14:useLocalDpi xmlns:a14="http://schemas.microsoft.com/office/drawing/2010/main" val="0"/>
-              </a:ext>
-            </a:extLst>
-          </a:blip>
-          <a:srcRect/>
-          <a:stretch>
-            <a:fillRect/>
-          </a:stretch>
-        </p:blipFill>
-        <p:spPr bwMode="auto">
-          <a:xfrm>
-            <a:off x="469536" y="2649194"/>
-            <a:ext cx="8014064" cy="4416730"/>
-          </a:xfrm>
-          <a:prstGeom prst="rect">
-            <a:avLst/>
-          </a:prstGeom>
-          <a:noFill/>
-          <a:extLst>
-            <a:ext uri="{909E8E84-426E-40DD-AFC4-6F175D3DCCD1}">
-              <a14:hiddenFill xmlns:a14="http://schemas.microsoft.com/office/drawing/2010/main">
-                <a:solidFill>
-                  <a:srgbClr val="FFFFFF"/>
-                </a:solidFill>
-              </a14:hiddenFill>
-            </a:ext>
-          </a:extLst>
-        </p:spPr>
-      </p:pic>
-      <p:sp>
-        <p:nvSpPr>
-          <p:cNvPr id="12" name="TextBox 11"/>
-          <p:cNvSpPr txBox="1"/>
-          <p:nvPr/>
-        </p:nvSpPr>
-        <p:spPr>
-          <a:xfrm>
-            <a:off x="8940800" y="2859989"/>
-            <a:ext cx="3901276" cy="1323439"/>
-          </a:xfrm>
-          <a:prstGeom prst="rect">
-            <a:avLst/>
-          </a:prstGeom>
-          <a:noFill/>
-        </p:spPr>
-        <p:txBody>
-          <a:bodyPr wrap="square" rtlCol="0">
-            <a:spAutoFit/>
-          </a:bodyPr>
-          <a:lstStyle/>
-          <a:p>
-            <a:r>
-              <a:rPr lang="en-US" sz="2000" dirty="0" smtClean="0"/>
-              <a:t>3 Sections of a </a:t>
-            </a:r>
-            <a:r>
-              <a:rPr lang="en-US" sz="2000" dirty="0" err="1" smtClean="0"/>
-              <a:t>Git</a:t>
-            </a:r>
-            <a:r>
-              <a:rPr lang="en-US" sz="2000" dirty="0" smtClean="0"/>
-              <a:t> Project</a:t>
-            </a:r>
-          </a:p>
-          <a:p>
-            <a:pPr marL="285750" indent="-285750">
-              <a:buFont typeface="Arial" panose="020B0604020202020204" pitchFamily="34" charset="0"/>
-              <a:buChar char="•"/>
-            </a:pPr>
-            <a:r>
-              <a:rPr lang="en-US" sz="2000" dirty="0" smtClean="0"/>
-              <a:t>Working Directory</a:t>
-            </a:r>
-          </a:p>
-          <a:p>
-            <a:pPr marL="285750" indent="-285750">
-              <a:buFont typeface="Arial" panose="020B0604020202020204" pitchFamily="34" charset="0"/>
-              <a:buChar char="•"/>
-            </a:pPr>
-            <a:r>
-              <a:rPr lang="en-US" sz="2000" dirty="0" smtClean="0"/>
-              <a:t>Staging Area</a:t>
-            </a:r>
-          </a:p>
-          <a:p>
-            <a:pPr marL="285750" indent="-285750">
-              <a:buFont typeface="Arial" panose="020B0604020202020204" pitchFamily="34" charset="0"/>
-              <a:buChar char="•"/>
-            </a:pPr>
-            <a:r>
-              <a:rPr lang="en-US" sz="2000" dirty="0" err="1" smtClean="0"/>
-              <a:t>Git</a:t>
-            </a:r>
-            <a:r>
-              <a:rPr lang="en-US" sz="2000" dirty="0" smtClean="0"/>
-              <a:t> Directory</a:t>
-            </a:r>
-            <a:endParaRPr lang="en-US" sz="2000" dirty="0"/>
-          </a:p>
-        </p:txBody>
-      </p:sp>
-      <p:sp>
-        <p:nvSpPr>
-          <p:cNvPr id="13" name="Shape 117"/>
+          <p:cNvPr id="117" name="Shape 117"/>
           <p:cNvSpPr/>
           <p:nvPr/>
         </p:nvSpPr>
@@ -4940,7 +5961,7 @@
             </a:pPr>
             <a:r>
               <a:rPr lang="en-US" sz="4400" b="1" dirty="0" smtClean="0"/>
-              <a:t>Three File States</a:t>
+              <a:t>VCS Benefits</a:t>
             </a:r>
             <a:endParaRPr sz="4400" b="1" dirty="0">
               <a:uFill>
@@ -4950,10 +5971,242 @@
           </a:p>
         </p:txBody>
       </p:sp>
+      <p:sp>
+        <p:nvSpPr>
+          <p:cNvPr id="7" name="Content Placeholder 2"/>
+          <p:cNvSpPr txBox="1">
+            <a:spLocks/>
+          </p:cNvSpPr>
+          <p:nvPr/>
+        </p:nvSpPr>
+        <p:spPr>
+          <a:xfrm>
+            <a:off x="596306" y="1118356"/>
+            <a:ext cx="11583588" cy="4774443"/>
+          </a:xfrm>
+          <a:prstGeom prst="rect">
+            <a:avLst/>
+          </a:prstGeom>
+        </p:spPr>
+        <p:txBody>
+          <a:bodyPr/>
+          <a:lstStyle>
+            <a:lvl1pPr marL="203200" indent="-203200" defTabSz="698500">
+              <a:lnSpc>
+                <a:spcPts val="3400"/>
+              </a:lnSpc>
+              <a:buSzPct val="70000"/>
+              <a:buFont typeface="Lucida Grande"/>
+              <a:buChar char="‣"/>
+              <a:defRPr sz="2600">
+                <a:uFill>
+                  <a:solidFill/>
+                </a:uFill>
+                <a:latin typeface="+mn-lt"/>
+                <a:ea typeface="+mn-ea"/>
+                <a:cs typeface="+mn-cs"/>
+                <a:sym typeface="News706BT-RomanC"/>
+              </a:defRPr>
+            </a:lvl1pPr>
+            <a:lvl2pPr marL="406400" indent="-203200" defTabSz="698500">
+              <a:lnSpc>
+                <a:spcPts val="3400"/>
+              </a:lnSpc>
+              <a:buSzPct val="70000"/>
+              <a:buFont typeface="Lucida Grande"/>
+              <a:buChar char="‣"/>
+              <a:defRPr sz="2600">
+                <a:uFill>
+                  <a:solidFill/>
+                </a:uFill>
+                <a:latin typeface="+mn-lt"/>
+                <a:ea typeface="+mn-ea"/>
+                <a:cs typeface="+mn-cs"/>
+                <a:sym typeface="News706BT-RomanC"/>
+              </a:defRPr>
+            </a:lvl2pPr>
+            <a:lvl3pPr marL="609600" indent="-203200" defTabSz="698500">
+              <a:lnSpc>
+                <a:spcPts val="3400"/>
+              </a:lnSpc>
+              <a:buSzPct val="70000"/>
+              <a:buFont typeface="Lucida Grande"/>
+              <a:buChar char="‣"/>
+              <a:defRPr sz="2600">
+                <a:uFill>
+                  <a:solidFill/>
+                </a:uFill>
+                <a:latin typeface="+mn-lt"/>
+                <a:ea typeface="+mn-ea"/>
+                <a:cs typeface="+mn-cs"/>
+                <a:sym typeface="News706BT-RomanC"/>
+              </a:defRPr>
+            </a:lvl3pPr>
+            <a:lvl4pPr marL="812800" indent="-203200" defTabSz="698500">
+              <a:lnSpc>
+                <a:spcPts val="3400"/>
+              </a:lnSpc>
+              <a:buSzPct val="70000"/>
+              <a:buFont typeface="Lucida Grande"/>
+              <a:buChar char="‣"/>
+              <a:defRPr sz="2600">
+                <a:uFill>
+                  <a:solidFill/>
+                </a:uFill>
+                <a:latin typeface="+mn-lt"/>
+                <a:ea typeface="+mn-ea"/>
+                <a:cs typeface="+mn-cs"/>
+                <a:sym typeface="News706BT-RomanC"/>
+              </a:defRPr>
+            </a:lvl4pPr>
+            <a:lvl5pPr marL="1016000" indent="-203200" defTabSz="698500">
+              <a:lnSpc>
+                <a:spcPts val="3400"/>
+              </a:lnSpc>
+              <a:buSzPct val="70000"/>
+              <a:buFont typeface="Lucida Grande"/>
+              <a:buChar char="‣"/>
+              <a:defRPr sz="2600">
+                <a:uFill>
+                  <a:solidFill/>
+                </a:uFill>
+                <a:latin typeface="+mn-lt"/>
+                <a:ea typeface="+mn-ea"/>
+                <a:cs typeface="+mn-cs"/>
+                <a:sym typeface="News706BT-RomanC"/>
+              </a:defRPr>
+            </a:lvl5pPr>
+            <a:lvl6pPr marL="1219200" indent="-203200" defTabSz="698500">
+              <a:lnSpc>
+                <a:spcPts val="3400"/>
+              </a:lnSpc>
+              <a:buSzPct val="70000"/>
+              <a:buFont typeface="Lucida Grande"/>
+              <a:buChar char="‣"/>
+              <a:defRPr sz="2600">
+                <a:uFill>
+                  <a:solidFill/>
+                </a:uFill>
+                <a:latin typeface="+mn-lt"/>
+                <a:ea typeface="+mn-ea"/>
+                <a:cs typeface="+mn-cs"/>
+                <a:sym typeface="News706BT-RomanC"/>
+              </a:defRPr>
+            </a:lvl6pPr>
+            <a:lvl7pPr marL="1422400" indent="-203200" defTabSz="698500">
+              <a:lnSpc>
+                <a:spcPts val="3400"/>
+              </a:lnSpc>
+              <a:buSzPct val="70000"/>
+              <a:buFont typeface="Lucida Grande"/>
+              <a:buChar char="‣"/>
+              <a:defRPr sz="2600">
+                <a:uFill>
+                  <a:solidFill/>
+                </a:uFill>
+                <a:latin typeface="+mn-lt"/>
+                <a:ea typeface="+mn-ea"/>
+                <a:cs typeface="+mn-cs"/>
+                <a:sym typeface="News706BT-RomanC"/>
+              </a:defRPr>
+            </a:lvl7pPr>
+            <a:lvl8pPr marL="1625600" indent="-203200" defTabSz="698500">
+              <a:lnSpc>
+                <a:spcPts val="3400"/>
+              </a:lnSpc>
+              <a:buSzPct val="70000"/>
+              <a:buFont typeface="Lucida Grande"/>
+              <a:buChar char="‣"/>
+              <a:defRPr sz="2600">
+                <a:uFill>
+                  <a:solidFill/>
+                </a:uFill>
+                <a:latin typeface="+mn-lt"/>
+                <a:ea typeface="+mn-ea"/>
+                <a:cs typeface="+mn-cs"/>
+                <a:sym typeface="News706BT-RomanC"/>
+              </a:defRPr>
+            </a:lvl8pPr>
+            <a:lvl9pPr marL="1828800" indent="-203200" defTabSz="698500">
+              <a:lnSpc>
+                <a:spcPts val="3400"/>
+              </a:lnSpc>
+              <a:buSzPct val="70000"/>
+              <a:buFont typeface="Lucida Grande"/>
+              <a:buChar char="‣"/>
+              <a:defRPr sz="2600">
+                <a:uFill>
+                  <a:solidFill/>
+                </a:uFill>
+                <a:latin typeface="+mn-lt"/>
+                <a:ea typeface="+mn-ea"/>
+                <a:cs typeface="+mn-cs"/>
+                <a:sym typeface="News706BT-RomanC"/>
+              </a:defRPr>
+            </a:lvl9pPr>
+          </a:lstStyle>
+          <a:p>
+            <a:pPr>
+              <a:lnSpc>
+                <a:spcPct val="150000"/>
+              </a:lnSpc>
+            </a:pPr>
+            <a:r>
+              <a:rPr lang="en-US" sz="3200" dirty="0" smtClean="0"/>
+              <a:t>Formal system for tracking different versions of projects</a:t>
+            </a:r>
+          </a:p>
+          <a:p>
+            <a:pPr>
+              <a:lnSpc>
+                <a:spcPct val="150000"/>
+              </a:lnSpc>
+            </a:pPr>
+            <a:r>
+              <a:rPr lang="en-US" sz="3200" dirty="0" smtClean="0"/>
+              <a:t>Useful for Software</a:t>
+            </a:r>
+          </a:p>
+          <a:p>
+            <a:pPr>
+              <a:lnSpc>
+                <a:spcPct val="150000"/>
+              </a:lnSpc>
+            </a:pPr>
+            <a:r>
+              <a:rPr lang="en-US" sz="3200" dirty="0" smtClean="0"/>
+              <a:t>Easy Collaboration</a:t>
+            </a:r>
+          </a:p>
+          <a:p>
+            <a:pPr>
+              <a:lnSpc>
+                <a:spcPct val="150000"/>
+              </a:lnSpc>
+            </a:pPr>
+            <a:r>
+              <a:rPr lang="en-US" sz="3200" dirty="0" smtClean="0"/>
+              <a:t>Involvement in Open Source Projects</a:t>
+            </a:r>
+          </a:p>
+          <a:p>
+            <a:pPr>
+              <a:lnSpc>
+                <a:spcPct val="150000"/>
+              </a:lnSpc>
+            </a:pPr>
+            <a:r>
+              <a:rPr lang="en-US" sz="3200" dirty="0" smtClean="0"/>
+              <a:t>Skill for Employment </a:t>
+            </a:r>
+            <a:endParaRPr lang="en-US" sz="3200" dirty="0"/>
+          </a:p>
+        </p:txBody>
+      </p:sp>
     </p:spTree>
     <p:extLst>
       <p:ext uri="{BB962C8B-B14F-4D97-AF65-F5344CB8AC3E}">
-        <p14:creationId xmlns:p14="http://schemas.microsoft.com/office/powerpoint/2010/main" val="1368089763"/>
+        <p14:creationId xmlns:p14="http://schemas.microsoft.com/office/powerpoint/2010/main" val="3484885767"/>
       </p:ext>
     </p:extLst>
   </p:cSld>
@@ -5127,7 +6380,7 @@
       </p:sp>
       <p:sp>
         <p:nvSpPr>
-          <p:cNvPr id="13" name="Shape 117"/>
+          <p:cNvPr id="117" name="Shape 117"/>
           <p:cNvSpPr/>
           <p:nvPr/>
         </p:nvSpPr>
@@ -5169,7 +6422,7 @@
             </a:pPr>
             <a:r>
               <a:rPr lang="en-US" sz="4400" b="1" dirty="0" smtClean="0"/>
-              <a:t>Basic Workflow</a:t>
+              <a:t>GitHub</a:t>
             </a:r>
             <a:endParaRPr sz="4400" b="1" dirty="0">
               <a:uFill>
@@ -5179,51 +6432,430 @@
           </a:p>
         </p:txBody>
       </p:sp>
-      <p:pic>
-        <p:nvPicPr>
-          <p:cNvPr id="9" name="Picture 2" descr="The lifecycle of the status of your files."/>
-          <p:cNvPicPr>
-            <a:picLocks noChangeAspect="1" noChangeArrowheads="1"/>
-          </p:cNvPicPr>
+      <p:sp>
+        <p:nvSpPr>
+          <p:cNvPr id="7" name="Content Placeholder 2"/>
+          <p:cNvSpPr txBox="1">
+            <a:spLocks/>
+          </p:cNvSpPr>
           <p:nvPr/>
-        </p:nvPicPr>
-        <p:blipFill>
-          <a:blip r:embed="rId3">
-            <a:extLst>
-              <a:ext uri="{28A0092B-C50C-407E-A947-70E740481C1C}">
-                <a14:useLocalDpi xmlns:a14="http://schemas.microsoft.com/office/drawing/2010/main" val="0"/>
-              </a:ext>
-            </a:extLst>
-          </a:blip>
-          <a:srcRect/>
-          <a:stretch>
-            <a:fillRect/>
-          </a:stretch>
-        </p:blipFill>
-        <p:spPr bwMode="auto">
+        </p:nvSpPr>
+        <p:spPr>
           <a:xfrm>
-            <a:off x="863600" y="1993139"/>
-            <a:ext cx="10000857" cy="4128261"/>
+            <a:off x="596306" y="1118357"/>
+            <a:ext cx="11583588" cy="2183644"/>
+          </a:xfrm>
+          <a:prstGeom prst="rect">
+            <a:avLst/>
+          </a:prstGeom>
+        </p:spPr>
+        <p:txBody>
+          <a:bodyPr/>
+          <a:lstStyle>
+            <a:lvl1pPr marL="203200" indent="-203200" defTabSz="698500">
+              <a:lnSpc>
+                <a:spcPts val="3400"/>
+              </a:lnSpc>
+              <a:buSzPct val="70000"/>
+              <a:buFont typeface="Lucida Grande"/>
+              <a:buChar char="‣"/>
+              <a:defRPr sz="2600">
+                <a:uFill>
+                  <a:solidFill/>
+                </a:uFill>
+                <a:latin typeface="+mn-lt"/>
+                <a:ea typeface="+mn-ea"/>
+                <a:cs typeface="+mn-cs"/>
+                <a:sym typeface="News706BT-RomanC"/>
+              </a:defRPr>
+            </a:lvl1pPr>
+            <a:lvl2pPr marL="406400" indent="-203200" defTabSz="698500">
+              <a:lnSpc>
+                <a:spcPts val="3400"/>
+              </a:lnSpc>
+              <a:buSzPct val="70000"/>
+              <a:buFont typeface="Lucida Grande"/>
+              <a:buChar char="‣"/>
+              <a:defRPr sz="2600">
+                <a:uFill>
+                  <a:solidFill/>
+                </a:uFill>
+                <a:latin typeface="+mn-lt"/>
+                <a:ea typeface="+mn-ea"/>
+                <a:cs typeface="+mn-cs"/>
+                <a:sym typeface="News706BT-RomanC"/>
+              </a:defRPr>
+            </a:lvl2pPr>
+            <a:lvl3pPr marL="609600" indent="-203200" defTabSz="698500">
+              <a:lnSpc>
+                <a:spcPts val="3400"/>
+              </a:lnSpc>
+              <a:buSzPct val="70000"/>
+              <a:buFont typeface="Lucida Grande"/>
+              <a:buChar char="‣"/>
+              <a:defRPr sz="2600">
+                <a:uFill>
+                  <a:solidFill/>
+                </a:uFill>
+                <a:latin typeface="+mn-lt"/>
+                <a:ea typeface="+mn-ea"/>
+                <a:cs typeface="+mn-cs"/>
+                <a:sym typeface="News706BT-RomanC"/>
+              </a:defRPr>
+            </a:lvl3pPr>
+            <a:lvl4pPr marL="812800" indent="-203200" defTabSz="698500">
+              <a:lnSpc>
+                <a:spcPts val="3400"/>
+              </a:lnSpc>
+              <a:buSzPct val="70000"/>
+              <a:buFont typeface="Lucida Grande"/>
+              <a:buChar char="‣"/>
+              <a:defRPr sz="2600">
+                <a:uFill>
+                  <a:solidFill/>
+                </a:uFill>
+                <a:latin typeface="+mn-lt"/>
+                <a:ea typeface="+mn-ea"/>
+                <a:cs typeface="+mn-cs"/>
+                <a:sym typeface="News706BT-RomanC"/>
+              </a:defRPr>
+            </a:lvl4pPr>
+            <a:lvl5pPr marL="1016000" indent="-203200" defTabSz="698500">
+              <a:lnSpc>
+                <a:spcPts val="3400"/>
+              </a:lnSpc>
+              <a:buSzPct val="70000"/>
+              <a:buFont typeface="Lucida Grande"/>
+              <a:buChar char="‣"/>
+              <a:defRPr sz="2600">
+                <a:uFill>
+                  <a:solidFill/>
+                </a:uFill>
+                <a:latin typeface="+mn-lt"/>
+                <a:ea typeface="+mn-ea"/>
+                <a:cs typeface="+mn-cs"/>
+                <a:sym typeface="News706BT-RomanC"/>
+              </a:defRPr>
+            </a:lvl5pPr>
+            <a:lvl6pPr marL="1219200" indent="-203200" defTabSz="698500">
+              <a:lnSpc>
+                <a:spcPts val="3400"/>
+              </a:lnSpc>
+              <a:buSzPct val="70000"/>
+              <a:buFont typeface="Lucida Grande"/>
+              <a:buChar char="‣"/>
+              <a:defRPr sz="2600">
+                <a:uFill>
+                  <a:solidFill/>
+                </a:uFill>
+                <a:latin typeface="+mn-lt"/>
+                <a:ea typeface="+mn-ea"/>
+                <a:cs typeface="+mn-cs"/>
+                <a:sym typeface="News706BT-RomanC"/>
+              </a:defRPr>
+            </a:lvl6pPr>
+            <a:lvl7pPr marL="1422400" indent="-203200" defTabSz="698500">
+              <a:lnSpc>
+                <a:spcPts val="3400"/>
+              </a:lnSpc>
+              <a:buSzPct val="70000"/>
+              <a:buFont typeface="Lucida Grande"/>
+              <a:buChar char="‣"/>
+              <a:defRPr sz="2600">
+                <a:uFill>
+                  <a:solidFill/>
+                </a:uFill>
+                <a:latin typeface="+mn-lt"/>
+                <a:ea typeface="+mn-ea"/>
+                <a:cs typeface="+mn-cs"/>
+                <a:sym typeface="News706BT-RomanC"/>
+              </a:defRPr>
+            </a:lvl7pPr>
+            <a:lvl8pPr marL="1625600" indent="-203200" defTabSz="698500">
+              <a:lnSpc>
+                <a:spcPts val="3400"/>
+              </a:lnSpc>
+              <a:buSzPct val="70000"/>
+              <a:buFont typeface="Lucida Grande"/>
+              <a:buChar char="‣"/>
+              <a:defRPr sz="2600">
+                <a:uFill>
+                  <a:solidFill/>
+                </a:uFill>
+                <a:latin typeface="+mn-lt"/>
+                <a:ea typeface="+mn-ea"/>
+                <a:cs typeface="+mn-cs"/>
+                <a:sym typeface="News706BT-RomanC"/>
+              </a:defRPr>
+            </a:lvl8pPr>
+            <a:lvl9pPr marL="1828800" indent="-203200" defTabSz="698500">
+              <a:lnSpc>
+                <a:spcPts val="3400"/>
+              </a:lnSpc>
+              <a:buSzPct val="70000"/>
+              <a:buFont typeface="Lucida Grande"/>
+              <a:buChar char="‣"/>
+              <a:defRPr sz="2600">
+                <a:uFill>
+                  <a:solidFill/>
+                </a:uFill>
+                <a:latin typeface="+mn-lt"/>
+                <a:ea typeface="+mn-ea"/>
+                <a:cs typeface="+mn-cs"/>
+                <a:sym typeface="News706BT-RomanC"/>
+              </a:defRPr>
+            </a:lvl9pPr>
+          </a:lstStyle>
+          <a:p>
+            <a:pPr>
+              <a:lnSpc>
+                <a:spcPct val="150000"/>
+              </a:lnSpc>
+            </a:pPr>
+            <a:r>
+              <a:rPr lang="en-US" sz="3200" dirty="0" smtClean="0"/>
+              <a:t>A website that allows you to put </a:t>
+            </a:r>
+            <a:r>
+              <a:rPr lang="en-US" sz="3200" dirty="0" err="1" smtClean="0"/>
+              <a:t>Git</a:t>
+            </a:r>
+            <a:r>
+              <a:rPr lang="en-US" sz="3200" dirty="0" smtClean="0"/>
+              <a:t> repos online</a:t>
+            </a:r>
+          </a:p>
+          <a:p>
+            <a:pPr>
+              <a:lnSpc>
+                <a:spcPct val="150000"/>
+              </a:lnSpc>
+            </a:pPr>
+            <a:r>
+              <a:rPr lang="en-US" sz="3200" dirty="0" smtClean="0"/>
+              <a:t>Not a VCS</a:t>
+            </a:r>
+          </a:p>
+          <a:p>
+            <a:pPr>
+              <a:lnSpc>
+                <a:spcPct val="150000"/>
+              </a:lnSpc>
+            </a:pPr>
+            <a:r>
+              <a:rPr lang="en-US" sz="3200" dirty="0" smtClean="0"/>
+              <a:t>Box for </a:t>
+            </a:r>
+            <a:r>
+              <a:rPr lang="en-US" sz="3200" dirty="0" err="1" smtClean="0"/>
+              <a:t>Git</a:t>
+            </a:r>
+            <a:endParaRPr lang="en-US" sz="3200" dirty="0" smtClean="0"/>
+          </a:p>
+          <a:p>
+            <a:pPr marL="0" indent="0">
+              <a:lnSpc>
+                <a:spcPct val="150000"/>
+              </a:lnSpc>
+              <a:buNone/>
+            </a:pPr>
+            <a:endParaRPr lang="en-US" sz="3200" dirty="0"/>
+          </a:p>
+        </p:txBody>
+      </p:sp>
+      <p:sp>
+        <p:nvSpPr>
+          <p:cNvPr id="2" name="TextBox 1"/>
+          <p:cNvSpPr txBox="1"/>
+          <p:nvPr/>
+        </p:nvSpPr>
+        <p:spPr>
+          <a:xfrm>
+            <a:off x="660400" y="3759200"/>
+            <a:ext cx="8268294" cy="2072362"/>
           </a:xfrm>
           <a:prstGeom prst="rect">
             <a:avLst/>
           </a:prstGeom>
           <a:noFill/>
-          <a:extLst>
-            <a:ext uri="{909E8E84-426E-40DD-AFC4-6F175D3DCCD1}">
-              <a14:hiddenFill xmlns:a14="http://schemas.microsoft.com/office/drawing/2010/main">
-                <a:solidFill>
-                  <a:srgbClr val="FFFFFF"/>
-                </a:solidFill>
-              </a14:hiddenFill>
-            </a:ext>
-          </a:extLst>
+          <a:ln w="12700" cap="flat">
+            <a:noFill/>
+            <a:miter lim="400000"/>
+          </a:ln>
+          <a:effectLst/>
         </p:spPr>
-      </p:pic>
+        <p:style>
+          <a:lnRef idx="0">
+            <a:scrgbClr r="0" g="0" b="0"/>
+          </a:lnRef>
+          <a:fillRef idx="0">
+            <a:scrgbClr r="0" g="0" b="0"/>
+          </a:fillRef>
+          <a:effectRef idx="0">
+            <a:scrgbClr r="0" g="0" b="0"/>
+          </a:effectRef>
+          <a:fontRef idx="none"/>
+        </p:style>
+        <p:txBody>
+          <a:bodyPr rot="0" spcFirstLastPara="1" vertOverflow="overflow" horzOverflow="overflow" vert="horz" wrap="square" lIns="50800" tIns="50800" rIns="50800" bIns="50800" numCol="1" spcCol="38100" rtlCol="0" anchor="ctr">
+            <a:spAutoFit/>
+          </a:bodyPr>
+          <a:lstStyle/>
+          <a:p>
+            <a:pPr marL="0" marR="0" indent="0" algn="l" defTabSz="1435100" rtl="0" fontAlgn="auto" latinLnBrk="1" hangingPunct="0">
+              <a:lnSpc>
+                <a:spcPct val="100000"/>
+              </a:lnSpc>
+              <a:spcBef>
+                <a:spcPts val="0"/>
+              </a:spcBef>
+              <a:spcAft>
+                <a:spcPts val="0"/>
+              </a:spcAft>
+              <a:buClrTx/>
+              <a:buSzTx/>
+              <a:buFontTx/>
+              <a:buNone/>
+              <a:tabLst/>
+            </a:pPr>
+            <a:r>
+              <a:rPr kumimoji="0" lang="en-US" sz="3200" b="1" i="0" u="sng" strike="noStrike" cap="none" spc="0" normalizeH="0" baseline="0" dirty="0" smtClean="0">
+                <a:ln>
+                  <a:noFill/>
+                </a:ln>
+                <a:solidFill>
+                  <a:srgbClr val="000000"/>
+                </a:solidFill>
+                <a:effectLst/>
+                <a:uFill>
+                  <a:solidFill>
+                    <a:srgbClr val="000000"/>
+                  </a:solidFill>
+                </a:uFill>
+                <a:sym typeface="News706BT-RomanC"/>
+              </a:rPr>
+              <a:t>Benefits:</a:t>
+            </a:r>
+          </a:p>
+          <a:p>
+            <a:pPr marL="342900" marR="0" indent="-342900" algn="l" defTabSz="1435100" rtl="0" fontAlgn="auto" latinLnBrk="1" hangingPunct="0">
+              <a:lnSpc>
+                <a:spcPct val="100000"/>
+              </a:lnSpc>
+              <a:spcBef>
+                <a:spcPts val="0"/>
+              </a:spcBef>
+              <a:spcAft>
+                <a:spcPts val="0"/>
+              </a:spcAft>
+              <a:buClrTx/>
+              <a:buSzTx/>
+              <a:buFont typeface="Arial" panose="020B0604020202020204" pitchFamily="34" charset="0"/>
+              <a:buChar char="•"/>
+              <a:tabLst/>
+            </a:pPr>
+            <a:r>
+              <a:rPr lang="en-US" sz="3200" dirty="0" smtClean="0">
+                <a:solidFill>
+                  <a:srgbClr val="000000"/>
+                </a:solidFill>
+                <a:uFill>
+                  <a:solidFill>
+                    <a:srgbClr val="000000"/>
+                  </a:solidFill>
+                </a:uFill>
+              </a:rPr>
+              <a:t>Backup</a:t>
+            </a:r>
+          </a:p>
+          <a:p>
+            <a:pPr marL="342900" marR="0" indent="-342900" algn="l" defTabSz="1435100" rtl="0" fontAlgn="auto" latinLnBrk="1" hangingPunct="0">
+              <a:lnSpc>
+                <a:spcPct val="100000"/>
+              </a:lnSpc>
+              <a:spcBef>
+                <a:spcPts val="0"/>
+              </a:spcBef>
+              <a:spcAft>
+                <a:spcPts val="0"/>
+              </a:spcAft>
+              <a:buClrTx/>
+              <a:buSzTx/>
+              <a:buFont typeface="Arial" panose="020B0604020202020204" pitchFamily="34" charset="0"/>
+              <a:buChar char="•"/>
+              <a:tabLst/>
+            </a:pPr>
+            <a:r>
+              <a:rPr kumimoji="0" lang="en-US" sz="3200" b="0" i="0" u="none" strike="noStrike" cap="none" spc="0" normalizeH="0" baseline="0" dirty="0" smtClean="0">
+                <a:ln>
+                  <a:noFill/>
+                </a:ln>
+                <a:solidFill>
+                  <a:srgbClr val="000000"/>
+                </a:solidFill>
+                <a:effectLst/>
+                <a:uFill>
+                  <a:solidFill>
+                    <a:srgbClr val="000000"/>
+                  </a:solidFill>
+                </a:uFill>
+                <a:sym typeface="News706BT-RomanC"/>
+              </a:rPr>
+              <a:t>Collaboration</a:t>
+            </a:r>
+          </a:p>
+          <a:p>
+            <a:pPr marL="342900" marR="0" indent="-342900" algn="l" defTabSz="1435100" rtl="0" fontAlgn="auto" latinLnBrk="1" hangingPunct="0">
+              <a:lnSpc>
+                <a:spcPct val="100000"/>
+              </a:lnSpc>
+              <a:spcBef>
+                <a:spcPts val="0"/>
+              </a:spcBef>
+              <a:spcAft>
+                <a:spcPts val="0"/>
+              </a:spcAft>
+              <a:buClrTx/>
+              <a:buSzTx/>
+              <a:buFont typeface="Arial" panose="020B0604020202020204" pitchFamily="34" charset="0"/>
+              <a:buChar char="•"/>
+              <a:tabLst/>
+            </a:pPr>
+            <a:r>
+              <a:rPr lang="en-US" sz="3200" dirty="0" smtClean="0">
+                <a:solidFill>
+                  <a:srgbClr val="000000"/>
+                </a:solidFill>
+                <a:uFill>
+                  <a:solidFill>
+                    <a:srgbClr val="000000"/>
+                  </a:solidFill>
+                </a:uFill>
+              </a:rPr>
+              <a:t>Visual Interface </a:t>
+            </a:r>
+            <a:endParaRPr kumimoji="0" lang="en-US" sz="3200" b="0" i="0" u="none" strike="noStrike" cap="none" spc="0" normalizeH="0" baseline="0" dirty="0">
+              <a:ln>
+                <a:noFill/>
+              </a:ln>
+              <a:solidFill>
+                <a:srgbClr val="000000"/>
+              </a:solidFill>
+              <a:effectLst/>
+              <a:uFill>
+                <a:solidFill>
+                  <a:srgbClr val="000000"/>
+                </a:solidFill>
+              </a:uFill>
+              <a:sym typeface="News706BT-RomanC"/>
+            </a:endParaRPr>
+          </a:p>
+        </p:txBody>
+      </p:sp>
     </p:spTree>
     <p:extLst>
       <p:ext uri="{BB962C8B-B14F-4D97-AF65-F5344CB8AC3E}">
-        <p14:creationId xmlns:p14="http://schemas.microsoft.com/office/powerpoint/2010/main" val="1044721641"/>
+        <p14:creationId xmlns:p14="http://schemas.microsoft.com/office/powerpoint/2010/main" val="622570429"/>
       </p:ext>
     </p:extLst>
   </p:cSld>
@@ -5397,13 +7029,333 @@
       </p:sp>
       <p:sp>
         <p:nvSpPr>
-          <p:cNvPr id="117" name="Shape 117"/>
+          <p:cNvPr id="10" name="Content Placeholder 2"/>
+          <p:cNvSpPr txBox="1">
+            <a:spLocks/>
+          </p:cNvSpPr>
+          <p:nvPr/>
+        </p:nvSpPr>
+        <p:spPr>
+          <a:xfrm>
+            <a:off x="305322" y="1075846"/>
+            <a:ext cx="8459788" cy="1479463"/>
+          </a:xfrm>
+          <a:prstGeom prst="rect">
+            <a:avLst/>
+          </a:prstGeom>
+        </p:spPr>
+        <p:txBody>
+          <a:bodyPr/>
+          <a:lstStyle>
+            <a:lvl1pPr marL="203200" indent="-203200" defTabSz="698500">
+              <a:lnSpc>
+                <a:spcPts val="3400"/>
+              </a:lnSpc>
+              <a:buSzPct val="70000"/>
+              <a:buFont typeface="Lucida Grande"/>
+              <a:buChar char="‣"/>
+              <a:defRPr sz="2600">
+                <a:uFill>
+                  <a:solidFill/>
+                </a:uFill>
+                <a:latin typeface="+mn-lt"/>
+                <a:ea typeface="+mn-ea"/>
+                <a:cs typeface="+mn-cs"/>
+                <a:sym typeface="News706BT-RomanC"/>
+              </a:defRPr>
+            </a:lvl1pPr>
+            <a:lvl2pPr marL="406400" indent="-203200" defTabSz="698500">
+              <a:lnSpc>
+                <a:spcPts val="3400"/>
+              </a:lnSpc>
+              <a:buSzPct val="70000"/>
+              <a:buFont typeface="Lucida Grande"/>
+              <a:buChar char="‣"/>
+              <a:defRPr sz="2600">
+                <a:uFill>
+                  <a:solidFill/>
+                </a:uFill>
+                <a:latin typeface="+mn-lt"/>
+                <a:ea typeface="+mn-ea"/>
+                <a:cs typeface="+mn-cs"/>
+                <a:sym typeface="News706BT-RomanC"/>
+              </a:defRPr>
+            </a:lvl2pPr>
+            <a:lvl3pPr marL="609600" indent="-203200" defTabSz="698500">
+              <a:lnSpc>
+                <a:spcPts val="3400"/>
+              </a:lnSpc>
+              <a:buSzPct val="70000"/>
+              <a:buFont typeface="Lucida Grande"/>
+              <a:buChar char="‣"/>
+              <a:defRPr sz="2600">
+                <a:uFill>
+                  <a:solidFill/>
+                </a:uFill>
+                <a:latin typeface="+mn-lt"/>
+                <a:ea typeface="+mn-ea"/>
+                <a:cs typeface="+mn-cs"/>
+                <a:sym typeface="News706BT-RomanC"/>
+              </a:defRPr>
+            </a:lvl3pPr>
+            <a:lvl4pPr marL="812800" indent="-203200" defTabSz="698500">
+              <a:lnSpc>
+                <a:spcPts val="3400"/>
+              </a:lnSpc>
+              <a:buSzPct val="70000"/>
+              <a:buFont typeface="Lucida Grande"/>
+              <a:buChar char="‣"/>
+              <a:defRPr sz="2600">
+                <a:uFill>
+                  <a:solidFill/>
+                </a:uFill>
+                <a:latin typeface="+mn-lt"/>
+                <a:ea typeface="+mn-ea"/>
+                <a:cs typeface="+mn-cs"/>
+                <a:sym typeface="News706BT-RomanC"/>
+              </a:defRPr>
+            </a:lvl4pPr>
+            <a:lvl5pPr marL="1016000" indent="-203200" defTabSz="698500">
+              <a:lnSpc>
+                <a:spcPts val="3400"/>
+              </a:lnSpc>
+              <a:buSzPct val="70000"/>
+              <a:buFont typeface="Lucida Grande"/>
+              <a:buChar char="‣"/>
+              <a:defRPr sz="2600">
+                <a:uFill>
+                  <a:solidFill/>
+                </a:uFill>
+                <a:latin typeface="+mn-lt"/>
+                <a:ea typeface="+mn-ea"/>
+                <a:cs typeface="+mn-cs"/>
+                <a:sym typeface="News706BT-RomanC"/>
+              </a:defRPr>
+            </a:lvl5pPr>
+            <a:lvl6pPr marL="1219200" indent="-203200" defTabSz="698500">
+              <a:lnSpc>
+                <a:spcPts val="3400"/>
+              </a:lnSpc>
+              <a:buSzPct val="70000"/>
+              <a:buFont typeface="Lucida Grande"/>
+              <a:buChar char="‣"/>
+              <a:defRPr sz="2600">
+                <a:uFill>
+                  <a:solidFill/>
+                </a:uFill>
+                <a:latin typeface="+mn-lt"/>
+                <a:ea typeface="+mn-ea"/>
+                <a:cs typeface="+mn-cs"/>
+                <a:sym typeface="News706BT-RomanC"/>
+              </a:defRPr>
+            </a:lvl6pPr>
+            <a:lvl7pPr marL="1422400" indent="-203200" defTabSz="698500">
+              <a:lnSpc>
+                <a:spcPts val="3400"/>
+              </a:lnSpc>
+              <a:buSzPct val="70000"/>
+              <a:buFont typeface="Lucida Grande"/>
+              <a:buChar char="‣"/>
+              <a:defRPr sz="2600">
+                <a:uFill>
+                  <a:solidFill/>
+                </a:uFill>
+                <a:latin typeface="+mn-lt"/>
+                <a:ea typeface="+mn-ea"/>
+                <a:cs typeface="+mn-cs"/>
+                <a:sym typeface="News706BT-RomanC"/>
+              </a:defRPr>
+            </a:lvl7pPr>
+            <a:lvl8pPr marL="1625600" indent="-203200" defTabSz="698500">
+              <a:lnSpc>
+                <a:spcPts val="3400"/>
+              </a:lnSpc>
+              <a:buSzPct val="70000"/>
+              <a:buFont typeface="Lucida Grande"/>
+              <a:buChar char="‣"/>
+              <a:defRPr sz="2600">
+                <a:uFill>
+                  <a:solidFill/>
+                </a:uFill>
+                <a:latin typeface="+mn-lt"/>
+                <a:ea typeface="+mn-ea"/>
+                <a:cs typeface="+mn-cs"/>
+                <a:sym typeface="News706BT-RomanC"/>
+              </a:defRPr>
+            </a:lvl8pPr>
+            <a:lvl9pPr marL="1828800" indent="-203200" defTabSz="698500">
+              <a:lnSpc>
+                <a:spcPts val="3400"/>
+              </a:lnSpc>
+              <a:buSzPct val="70000"/>
+              <a:buFont typeface="Lucida Grande"/>
+              <a:buChar char="‣"/>
+              <a:defRPr sz="2600">
+                <a:uFill>
+                  <a:solidFill/>
+                </a:uFill>
+                <a:latin typeface="+mn-lt"/>
+                <a:ea typeface="+mn-ea"/>
+                <a:cs typeface="+mn-cs"/>
+                <a:sym typeface="News706BT-RomanC"/>
+              </a:defRPr>
+            </a:lvl9pPr>
+          </a:lstStyle>
+          <a:p>
+            <a:pPr marL="457200" indent="-457200">
+              <a:buFont typeface="Arial" panose="020B0604020202020204" pitchFamily="34" charset="0"/>
+              <a:buChar char="•"/>
+            </a:pPr>
+            <a:r>
+              <a:rPr lang="en-US" sz="2000" dirty="0" smtClean="0"/>
+              <a:t>Committed: Data stored in local database</a:t>
+            </a:r>
+          </a:p>
+          <a:p>
+            <a:pPr marL="457200" indent="-457200">
+              <a:buFont typeface="Arial" panose="020B0604020202020204" pitchFamily="34" charset="0"/>
+              <a:buChar char="•"/>
+            </a:pPr>
+            <a:r>
+              <a:rPr lang="en-US" sz="2000" dirty="0" smtClean="0"/>
+              <a:t>Modified: Changed but not committed yet</a:t>
+            </a:r>
+          </a:p>
+          <a:p>
+            <a:pPr marL="457200" indent="-457200">
+              <a:buFont typeface="Arial" panose="020B0604020202020204" pitchFamily="34" charset="0"/>
+              <a:buChar char="•"/>
+            </a:pPr>
+            <a:r>
+              <a:rPr lang="en-US" sz="2000" dirty="0" smtClean="0"/>
+              <a:t>Staged: Marked in its current version to go into next commit</a:t>
+            </a:r>
+            <a:endParaRPr lang="en-US" sz="2000" dirty="0"/>
+          </a:p>
+        </p:txBody>
+      </p:sp>
+      <p:pic>
+        <p:nvPicPr>
+          <p:cNvPr id="11" name="Picture 2" descr="Working directory, staging area, and Git directory."/>
+          <p:cNvPicPr>
+            <a:picLocks noChangeAspect="1" noChangeArrowheads="1"/>
+          </p:cNvPicPr>
+          <p:nvPr/>
+        </p:nvPicPr>
+        <p:blipFill>
+          <a:blip r:embed="rId3">
+            <a:extLst>
+              <a:ext uri="{28A0092B-C50C-407E-A947-70E740481C1C}">
+                <a14:useLocalDpi xmlns:a14="http://schemas.microsoft.com/office/drawing/2010/main" val="0"/>
+              </a:ext>
+            </a:extLst>
+          </a:blip>
+          <a:srcRect/>
+          <a:stretch>
+            <a:fillRect/>
+          </a:stretch>
+        </p:blipFill>
+        <p:spPr bwMode="auto">
+          <a:xfrm>
+            <a:off x="469536" y="2649194"/>
+            <a:ext cx="8014064" cy="4416730"/>
+          </a:xfrm>
+          <a:prstGeom prst="rect">
+            <a:avLst/>
+          </a:prstGeom>
+          <a:noFill/>
+          <a:extLst>
+            <a:ext uri="{909E8E84-426E-40DD-AFC4-6F175D3DCCD1}">
+              <a14:hiddenFill xmlns:a14="http://schemas.microsoft.com/office/drawing/2010/main">
+                <a:solidFill>
+                  <a:srgbClr val="FFFFFF"/>
+                </a:solidFill>
+              </a14:hiddenFill>
+            </a:ext>
+          </a:extLst>
+        </p:spPr>
+      </p:pic>
+      <p:sp>
+        <p:nvSpPr>
+          <p:cNvPr id="12" name="TextBox 11"/>
+          <p:cNvSpPr txBox="1"/>
+          <p:nvPr/>
+        </p:nvSpPr>
+        <p:spPr>
+          <a:xfrm>
+            <a:off x="8940800" y="2859989"/>
+            <a:ext cx="3901276" cy="1323439"/>
+          </a:xfrm>
+          <a:prstGeom prst="rect">
+            <a:avLst/>
+          </a:prstGeom>
+          <a:noFill/>
+        </p:spPr>
+        <p:txBody>
+          <a:bodyPr wrap="square" rtlCol="0">
+            <a:spAutoFit/>
+          </a:bodyPr>
+          <a:lstStyle/>
+          <a:p>
+            <a:r>
+              <a:rPr lang="en-US" sz="2000" dirty="0" smtClean="0"/>
+              <a:t>3 Sections of a </a:t>
+            </a:r>
+            <a:r>
+              <a:rPr lang="en-US" sz="2000" dirty="0" err="1" smtClean="0"/>
+              <a:t>Git</a:t>
+            </a:r>
+            <a:r>
+              <a:rPr lang="en-US" sz="2000" dirty="0" smtClean="0"/>
+              <a:t> Project</a:t>
+            </a:r>
+          </a:p>
+          <a:p>
+            <a:pPr marL="285750" indent="-285750">
+              <a:buFont typeface="Arial" panose="020B0604020202020204" pitchFamily="34" charset="0"/>
+              <a:buChar char="•"/>
+            </a:pPr>
+            <a:r>
+              <a:rPr lang="en-US" sz="2000" dirty="0" smtClean="0"/>
+              <a:t>Working Directory</a:t>
+            </a:r>
+          </a:p>
+          <a:p>
+            <a:pPr marL="285750" indent="-285750">
+              <a:buFont typeface="Arial" panose="020B0604020202020204" pitchFamily="34" charset="0"/>
+              <a:buChar char="•"/>
+            </a:pPr>
+            <a:r>
+              <a:rPr lang="en-US" sz="2000" dirty="0" smtClean="0"/>
+              <a:t>Staging Area</a:t>
+            </a:r>
+          </a:p>
+          <a:p>
+            <a:pPr marL="285750" indent="-285750">
+              <a:buFont typeface="Arial" panose="020B0604020202020204" pitchFamily="34" charset="0"/>
+              <a:buChar char="•"/>
+            </a:pPr>
+            <a:r>
+              <a:rPr lang="en-US" sz="2000" dirty="0" err="1" smtClean="0"/>
+              <a:t>Git</a:t>
+            </a:r>
+            <a:r>
+              <a:rPr lang="en-US" sz="2000" dirty="0" smtClean="0"/>
+              <a:t> Directory</a:t>
+            </a:r>
+            <a:endParaRPr lang="en-US" sz="2000" dirty="0"/>
+          </a:p>
+        </p:txBody>
+      </p:sp>
+      <p:sp>
+        <p:nvSpPr>
+          <p:cNvPr id="13" name="Shape 117"/>
           <p:cNvSpPr/>
           <p:nvPr/>
         </p:nvSpPr>
         <p:spPr>
           <a:xfrm>
-            <a:off x="637376" y="0"/>
+            <a:off x="660400" y="50800"/>
             <a:ext cx="11747500" cy="687048"/>
           </a:xfrm>
           <a:prstGeom prst="rect">
@@ -5438,12 +7390,8 @@
               </a:defRPr>
             </a:pPr>
             <a:r>
-              <a:rPr lang="en-US" sz="4400" b="1" dirty="0" smtClean="0">
-                <a:uFill>
-                  <a:solidFill/>
-                </a:uFill>
-              </a:rPr>
-              <a:t>Commands</a:t>
+              <a:rPr lang="en-US" sz="4400" b="1" dirty="0" smtClean="0"/>
+              <a:t>Three File States</a:t>
             </a:r>
             <a:endParaRPr sz="4400" b="1" dirty="0">
               <a:uFill>
@@ -5453,713 +7401,10 @@
           </a:p>
         </p:txBody>
       </p:sp>
-      <p:sp>
-        <p:nvSpPr>
-          <p:cNvPr id="4" name="TextBox 3"/>
-          <p:cNvSpPr txBox="1"/>
-          <p:nvPr/>
-        </p:nvSpPr>
-        <p:spPr>
-          <a:xfrm>
-            <a:off x="417912" y="1397000"/>
-            <a:ext cx="11940376" cy="5867400"/>
-          </a:xfrm>
-          <a:prstGeom prst="rect">
-            <a:avLst/>
-          </a:prstGeom>
-          <a:noFill/>
-          <a:ln w="12700" cap="flat">
-            <a:noFill/>
-            <a:miter lim="400000"/>
-          </a:ln>
-          <a:effectLst/>
-        </p:spPr>
-        <p:style>
-          <a:lnRef idx="0">
-            <a:scrgbClr r="0" g="0" b="0"/>
-          </a:lnRef>
-          <a:fillRef idx="0">
-            <a:scrgbClr r="0" g="0" b="0"/>
-          </a:fillRef>
-          <a:effectRef idx="0">
-            <a:scrgbClr r="0" g="0" b="0"/>
-          </a:effectRef>
-          <a:fontRef idx="none"/>
-        </p:style>
-        <p:txBody>
-          <a:bodyPr rot="0" spcFirstLastPara="1" vertOverflow="overflow" horzOverflow="overflow" vert="horz" wrap="none" lIns="50800" tIns="50800" rIns="50800" bIns="50800" numCol="1" spcCol="38100" rtlCol="0" anchor="ctr">
-            <a:noAutofit/>
-          </a:bodyPr>
-          <a:lstStyle/>
-          <a:p>
-            <a:pPr marR="0" algn="l" defTabSz="1435100" rtl="0" fontAlgn="auto" latinLnBrk="1" hangingPunct="0">
-              <a:lnSpc>
-                <a:spcPct val="100000"/>
-              </a:lnSpc>
-              <a:spcBef>
-                <a:spcPts val="0"/>
-              </a:spcBef>
-              <a:spcAft>
-                <a:spcPts val="0"/>
-              </a:spcAft>
-              <a:buClrTx/>
-              <a:buSzTx/>
-              <a:tabLst/>
-            </a:pPr>
-            <a:r>
-              <a:rPr kumimoji="0" lang="en-US" sz="2200" b="1" i="0" u="sng" strike="noStrike" cap="none" spc="0" normalizeH="0" baseline="0" dirty="0" smtClean="0">
-                <a:ln>
-                  <a:noFill/>
-                </a:ln>
-                <a:solidFill>
-                  <a:srgbClr val="000000"/>
-                </a:solidFill>
-                <a:effectLst/>
-                <a:uFill>
-                  <a:solidFill>
-                    <a:srgbClr val="000000"/>
-                  </a:solidFill>
-                </a:uFill>
-                <a:latin typeface="+mn-lt"/>
-                <a:ea typeface="+mn-ea"/>
-                <a:cs typeface="+mn-cs"/>
-                <a:sym typeface="News706BT-RomanC"/>
-              </a:rPr>
-              <a:t>Fork a repo</a:t>
-            </a:r>
-            <a:r>
-              <a:rPr kumimoji="0" lang="en-US" sz="2200" b="0" i="0" u="none" strike="noStrike" cap="none" spc="0" normalizeH="0" baseline="0" dirty="0" smtClean="0">
-                <a:ln>
-                  <a:noFill/>
-                </a:ln>
-                <a:solidFill>
-                  <a:srgbClr val="000000"/>
-                </a:solidFill>
-                <a:effectLst/>
-                <a:uFill>
-                  <a:solidFill>
-                    <a:srgbClr val="000000"/>
-                  </a:solidFill>
-                </a:uFill>
-                <a:latin typeface="+mn-lt"/>
-                <a:ea typeface="+mn-ea"/>
-                <a:cs typeface="+mn-cs"/>
-                <a:sym typeface="News706BT-RomanC"/>
-              </a:rPr>
-              <a:t>: Make a copy of a repo in your account. </a:t>
-            </a:r>
-          </a:p>
-          <a:p>
-            <a:pPr marL="342900" lvl="8" indent="-342900" algn="l" rtl="0" latinLnBrk="1" hangingPunct="0">
-              <a:buFont typeface="Arial" panose="020B0604020202020204" pitchFamily="34" charset="0"/>
-              <a:buChar char="•"/>
-            </a:pPr>
-            <a:r>
-              <a:rPr kumimoji="0" lang="en-US" b="0" i="0" u="none" strike="noStrike" cap="none" spc="0" normalizeH="0" baseline="0" dirty="0" smtClean="0">
-                <a:ln>
-                  <a:noFill/>
-                </a:ln>
-                <a:solidFill>
-                  <a:srgbClr val="000000"/>
-                </a:solidFill>
-                <a:effectLst/>
-                <a:uFill>
-                  <a:solidFill>
-                    <a:srgbClr val="000000"/>
-                  </a:solidFill>
-                </a:uFill>
-                <a:latin typeface="+mn-lt"/>
-                <a:ea typeface="+mn-ea"/>
-                <a:cs typeface="+mn-cs"/>
-                <a:sym typeface="News706BT-RomanC"/>
-              </a:rPr>
-              <a:t>Log into GitHub</a:t>
-            </a:r>
-          </a:p>
-          <a:p>
-            <a:pPr marL="342900" lvl="8" indent="-342900" algn="l" rtl="0" latinLnBrk="1" hangingPunct="0">
-              <a:buFont typeface="Arial" panose="020B0604020202020204" pitchFamily="34" charset="0"/>
-              <a:buChar char="•"/>
-            </a:pPr>
-            <a:r>
-              <a:rPr lang="en-US" dirty="0">
-                <a:solidFill>
-                  <a:srgbClr val="000000"/>
-                </a:solidFill>
-                <a:uFill>
-                  <a:solidFill>
-                    <a:srgbClr val="000000"/>
-                  </a:solidFill>
-                </a:uFill>
-              </a:rPr>
-              <a:t>G</a:t>
-            </a:r>
-            <a:r>
-              <a:rPr kumimoji="0" lang="en-US" b="0" i="0" u="none" strike="noStrike" cap="none" spc="0" normalizeH="0" baseline="0" dirty="0" smtClean="0">
-                <a:ln>
-                  <a:noFill/>
-                </a:ln>
-                <a:solidFill>
-                  <a:srgbClr val="000000"/>
-                </a:solidFill>
-                <a:effectLst/>
-                <a:uFill>
-                  <a:solidFill>
-                    <a:srgbClr val="000000"/>
-                  </a:solidFill>
-                </a:uFill>
-                <a:latin typeface="+mn-lt"/>
-                <a:ea typeface="+mn-ea"/>
-                <a:cs typeface="+mn-cs"/>
-                <a:sym typeface="News706BT-RomanC"/>
-              </a:rPr>
-              <a:t>o to repository</a:t>
-            </a:r>
-            <a:endParaRPr lang="en-US" dirty="0">
-              <a:solidFill>
-                <a:srgbClr val="000000"/>
-              </a:solidFill>
-              <a:uFill>
-                <a:solidFill>
-                  <a:srgbClr val="000000"/>
-                </a:solidFill>
-              </a:uFill>
-            </a:endParaRPr>
-          </a:p>
-          <a:p>
-            <a:pPr marL="342900" lvl="8" indent="-342900" algn="l" rtl="0" latinLnBrk="1" hangingPunct="0">
-              <a:buFont typeface="Arial" panose="020B0604020202020204" pitchFamily="34" charset="0"/>
-              <a:buChar char="•"/>
-            </a:pPr>
-            <a:r>
-              <a:rPr lang="en-US" dirty="0">
-                <a:solidFill>
-                  <a:srgbClr val="000000"/>
-                </a:solidFill>
-                <a:uFill>
-                  <a:solidFill>
-                    <a:srgbClr val="000000"/>
-                  </a:solidFill>
-                </a:uFill>
-              </a:rPr>
-              <a:t>C</a:t>
-            </a:r>
-            <a:r>
-              <a:rPr kumimoji="0" lang="en-US" b="0" i="0" u="none" strike="noStrike" cap="none" spc="0" normalizeH="0" dirty="0" smtClean="0">
-                <a:ln>
-                  <a:noFill/>
-                </a:ln>
-                <a:solidFill>
-                  <a:srgbClr val="000000"/>
-                </a:solidFill>
-                <a:effectLst/>
-                <a:uFill>
-                  <a:solidFill>
-                    <a:srgbClr val="000000"/>
-                  </a:solidFill>
-                </a:uFill>
-                <a:latin typeface="+mn-lt"/>
-                <a:ea typeface="+mn-ea"/>
-                <a:cs typeface="+mn-cs"/>
-                <a:sym typeface="News706BT-RomanC"/>
-              </a:rPr>
-              <a:t>lick fork</a:t>
-            </a:r>
-          </a:p>
-          <a:p>
-            <a:pPr lvl="8" indent="0" algn="l" rtl="0" latinLnBrk="1" hangingPunct="0"/>
-            <a:r>
-              <a:rPr lang="en-US" b="1" u="sng" baseline="0" dirty="0" smtClean="0">
-                <a:solidFill>
-                  <a:srgbClr val="000000"/>
-                </a:solidFill>
-                <a:uFill>
-                  <a:solidFill>
-                    <a:srgbClr val="000000"/>
-                  </a:solidFill>
-                </a:uFill>
-              </a:rPr>
-              <a:t>Pull: </a:t>
-            </a:r>
-            <a:r>
-              <a:rPr lang="en-US" baseline="0" dirty="0" smtClean="0">
-                <a:solidFill>
-                  <a:srgbClr val="000000"/>
-                </a:solidFill>
-                <a:uFill>
-                  <a:solidFill>
-                    <a:srgbClr val="000000"/>
-                  </a:solidFill>
-                </a:uFill>
-              </a:rPr>
-              <a:t>Pull your changes into a repo</a:t>
-            </a:r>
-          </a:p>
-          <a:p>
-            <a:pPr lvl="8" indent="0" algn="l" rtl="0" latinLnBrk="1" hangingPunct="0"/>
-            <a:r>
-              <a:rPr kumimoji="0" lang="en-US" b="1" i="0" u="sng" strike="noStrike" cap="none" spc="0" normalizeH="0" dirty="0" smtClean="0">
-                <a:ln>
-                  <a:noFill/>
-                </a:ln>
-                <a:solidFill>
-                  <a:srgbClr val="000000"/>
-                </a:solidFill>
-                <a:effectLst/>
-                <a:uFill>
-                  <a:solidFill>
-                    <a:srgbClr val="000000"/>
-                  </a:solidFill>
-                </a:uFill>
-                <a:latin typeface="+mn-lt"/>
-                <a:ea typeface="+mn-ea"/>
-                <a:cs typeface="+mn-cs"/>
-                <a:sym typeface="News706BT-RomanC"/>
-              </a:rPr>
-              <a:t>Create a new repository</a:t>
-            </a:r>
-          </a:p>
-          <a:p>
-            <a:pPr marL="342900" lvl="8" indent="-342900" algn="l" rtl="0" latinLnBrk="1" hangingPunct="0">
-              <a:buFont typeface="Arial" panose="020B0604020202020204" pitchFamily="34" charset="0"/>
-              <a:buChar char="•"/>
-            </a:pPr>
-            <a:r>
-              <a:rPr lang="en-US" baseline="0" dirty="0" smtClean="0">
-                <a:solidFill>
-                  <a:srgbClr val="000000"/>
-                </a:solidFill>
-                <a:uFill>
-                  <a:solidFill>
-                    <a:srgbClr val="000000"/>
-                  </a:solidFill>
-                </a:uFill>
-              </a:rPr>
-              <a:t>Click on + then new repository</a:t>
-            </a:r>
-            <a:r>
-              <a:rPr lang="en-US" dirty="0" smtClean="0">
-                <a:solidFill>
-                  <a:srgbClr val="000000"/>
-                </a:solidFill>
-                <a:uFill>
-                  <a:solidFill>
-                    <a:srgbClr val="000000"/>
-                  </a:solidFill>
-                </a:uFill>
-              </a:rPr>
-              <a:t> </a:t>
-            </a:r>
-          </a:p>
-          <a:p>
-            <a:pPr marL="342900" lvl="8" indent="-342900" algn="l" rtl="0" latinLnBrk="1" hangingPunct="0">
-              <a:buFont typeface="Arial" panose="020B0604020202020204" pitchFamily="34" charset="0"/>
-              <a:buChar char="•"/>
-            </a:pPr>
-            <a:r>
-              <a:rPr kumimoji="0" lang="en-US" i="0" strike="noStrike" cap="none" spc="0" normalizeH="0" baseline="0" dirty="0" smtClean="0">
-                <a:ln>
-                  <a:noFill/>
-                </a:ln>
-                <a:solidFill>
-                  <a:srgbClr val="000000"/>
-                </a:solidFill>
-                <a:effectLst/>
-                <a:uFill>
-                  <a:solidFill>
-                    <a:srgbClr val="000000"/>
-                  </a:solidFill>
-                </a:uFill>
-                <a:latin typeface="+mn-lt"/>
-                <a:ea typeface="+mn-ea"/>
-                <a:cs typeface="+mn-cs"/>
-                <a:sym typeface="News706BT-RomanC"/>
-              </a:rPr>
-              <a:t>Choose</a:t>
-            </a:r>
-            <a:r>
-              <a:rPr kumimoji="0" lang="en-US" i="0" strike="noStrike" cap="none" spc="0" normalizeH="0" dirty="0" smtClean="0">
-                <a:ln>
-                  <a:noFill/>
-                </a:ln>
-                <a:solidFill>
-                  <a:srgbClr val="000000"/>
-                </a:solidFill>
-                <a:effectLst/>
-                <a:uFill>
-                  <a:solidFill>
-                    <a:srgbClr val="000000"/>
-                  </a:solidFill>
-                </a:uFill>
-                <a:latin typeface="+mn-lt"/>
-                <a:ea typeface="+mn-ea"/>
-                <a:cs typeface="+mn-cs"/>
-                <a:sym typeface="News706BT-RomanC"/>
-              </a:rPr>
-              <a:t> name and description</a:t>
-            </a:r>
-          </a:p>
-          <a:p>
-            <a:pPr marL="342900" lvl="8" indent="-342900" algn="l" rtl="0" latinLnBrk="1" hangingPunct="0">
-              <a:buFont typeface="Arial" panose="020B0604020202020204" pitchFamily="34" charset="0"/>
-              <a:buChar char="•"/>
-            </a:pPr>
-            <a:r>
-              <a:rPr lang="en-US" baseline="0" dirty="0" smtClean="0">
-                <a:solidFill>
-                  <a:srgbClr val="000000"/>
-                </a:solidFill>
-                <a:uFill>
-                  <a:solidFill>
-                    <a:srgbClr val="000000"/>
-                  </a:solidFill>
-                </a:uFill>
-              </a:rPr>
-              <a:t>Public</a:t>
-            </a:r>
-          </a:p>
-          <a:p>
-            <a:pPr marL="342900" lvl="8" indent="-342900" algn="l" rtl="0" latinLnBrk="1" hangingPunct="0">
-              <a:buFont typeface="Arial" panose="020B0604020202020204" pitchFamily="34" charset="0"/>
-              <a:buChar char="•"/>
-            </a:pPr>
-            <a:r>
-              <a:rPr lang="en-US" dirty="0" smtClean="0">
-                <a:solidFill>
-                  <a:srgbClr val="000000"/>
-                </a:solidFill>
-                <a:uFill>
-                  <a:solidFill>
-                    <a:srgbClr val="000000"/>
-                  </a:solidFill>
-                </a:uFill>
-              </a:rPr>
-              <a:t>Initial readme</a:t>
-            </a:r>
-          </a:p>
-          <a:p>
-            <a:pPr marL="342900" lvl="8" indent="-342900" algn="l" rtl="0" latinLnBrk="1" hangingPunct="0">
-              <a:buFont typeface="Arial" panose="020B0604020202020204" pitchFamily="34" charset="0"/>
-              <a:buChar char="•"/>
-            </a:pPr>
-            <a:r>
-              <a:rPr kumimoji="0" lang="en-US" i="0" strike="noStrike" cap="none" spc="0" normalizeH="0" baseline="0" dirty="0" smtClean="0">
-                <a:ln>
-                  <a:noFill/>
-                </a:ln>
-                <a:solidFill>
-                  <a:srgbClr val="000000"/>
-                </a:solidFill>
-                <a:effectLst/>
-                <a:uFill>
-                  <a:solidFill>
-                    <a:srgbClr val="000000"/>
-                  </a:solidFill>
-                </a:uFill>
-                <a:latin typeface="+mn-lt"/>
-                <a:ea typeface="+mn-ea"/>
-                <a:cs typeface="+mn-cs"/>
-                <a:sym typeface="News706BT-RomanC"/>
-              </a:rPr>
-              <a:t>Click</a:t>
-            </a:r>
-            <a:r>
-              <a:rPr kumimoji="0" lang="en-US" i="0" strike="noStrike" cap="none" spc="0" normalizeH="0" dirty="0" smtClean="0">
-                <a:ln>
-                  <a:noFill/>
-                </a:ln>
-                <a:solidFill>
-                  <a:srgbClr val="000000"/>
-                </a:solidFill>
-                <a:effectLst/>
-                <a:uFill>
-                  <a:solidFill>
-                    <a:srgbClr val="000000"/>
-                  </a:solidFill>
-                </a:uFill>
-                <a:latin typeface="+mn-lt"/>
-                <a:ea typeface="+mn-ea"/>
-                <a:cs typeface="+mn-cs"/>
-                <a:sym typeface="News706BT-RomanC"/>
-              </a:rPr>
-              <a:t> create</a:t>
-            </a:r>
-          </a:p>
-          <a:p>
-            <a:pPr lvl="8" indent="0" algn="l" rtl="0" latinLnBrk="1" hangingPunct="0"/>
-            <a:r>
-              <a:rPr lang="en-US" b="1" u="sng" baseline="0" dirty="0" smtClean="0">
-                <a:solidFill>
-                  <a:srgbClr val="000000"/>
-                </a:solidFill>
-                <a:uFill>
-                  <a:solidFill>
-                    <a:srgbClr val="000000"/>
-                  </a:solidFill>
-                </a:uFill>
-              </a:rPr>
-              <a:t>Copying repo to local computer:</a:t>
-            </a:r>
-          </a:p>
-          <a:p>
-            <a:pPr marL="342900" lvl="8" indent="-342900" algn="l" rtl="0" latinLnBrk="1" hangingPunct="0">
-              <a:buFont typeface="Arial" panose="020B0604020202020204" pitchFamily="34" charset="0"/>
-              <a:buChar char="•"/>
-            </a:pPr>
-            <a:r>
-              <a:rPr kumimoji="0" lang="en-US" i="0" strike="noStrike" cap="none" spc="0" normalizeH="0" dirty="0" smtClean="0">
-                <a:ln>
-                  <a:noFill/>
-                </a:ln>
-                <a:solidFill>
-                  <a:srgbClr val="000000"/>
-                </a:solidFill>
-                <a:effectLst/>
-                <a:uFill>
-                  <a:solidFill>
-                    <a:srgbClr val="000000"/>
-                  </a:solidFill>
-                </a:uFill>
-                <a:latin typeface="+mn-lt"/>
-                <a:ea typeface="+mn-ea"/>
-                <a:cs typeface="+mn-cs"/>
-                <a:sym typeface="News706BT-RomanC"/>
-              </a:rPr>
-              <a:t>Open </a:t>
-            </a:r>
-            <a:r>
-              <a:rPr kumimoji="0" lang="en-US" i="0" strike="noStrike" cap="none" spc="0" normalizeH="0" dirty="0" err="1" smtClean="0">
-                <a:ln>
-                  <a:noFill/>
-                </a:ln>
-                <a:solidFill>
-                  <a:srgbClr val="000000"/>
-                </a:solidFill>
-                <a:effectLst/>
-                <a:uFill>
-                  <a:solidFill>
-                    <a:srgbClr val="000000"/>
-                  </a:solidFill>
-                </a:uFill>
-                <a:latin typeface="+mn-lt"/>
-                <a:ea typeface="+mn-ea"/>
-                <a:cs typeface="+mn-cs"/>
-                <a:sym typeface="News706BT-RomanC"/>
-              </a:rPr>
-              <a:t>git</a:t>
-            </a:r>
-            <a:r>
-              <a:rPr kumimoji="0" lang="en-US" i="0" strike="noStrike" cap="none" spc="0" normalizeH="0" dirty="0" smtClean="0">
-                <a:ln>
-                  <a:noFill/>
-                </a:ln>
-                <a:solidFill>
-                  <a:srgbClr val="000000"/>
-                </a:solidFill>
-                <a:effectLst/>
-                <a:uFill>
-                  <a:solidFill>
-                    <a:srgbClr val="000000"/>
-                  </a:solidFill>
-                </a:uFill>
-                <a:latin typeface="+mn-lt"/>
-                <a:ea typeface="+mn-ea"/>
-                <a:cs typeface="+mn-cs"/>
-                <a:sym typeface="News706BT-RomanC"/>
-              </a:rPr>
-              <a:t>, terminal</a:t>
-            </a:r>
-          </a:p>
-          <a:p>
-            <a:pPr marL="342900" lvl="8" indent="-342900" algn="l" rtl="0" latinLnBrk="1" hangingPunct="0">
-              <a:buFont typeface="Arial" panose="020B0604020202020204" pitchFamily="34" charset="0"/>
-              <a:buChar char="•"/>
-            </a:pPr>
-            <a:r>
-              <a:rPr lang="en-US" baseline="0" dirty="0" smtClean="0">
-                <a:solidFill>
-                  <a:srgbClr val="000000"/>
-                </a:solidFill>
-                <a:uFill>
-                  <a:solidFill>
-                    <a:srgbClr val="000000"/>
-                  </a:solidFill>
-                </a:uFill>
-              </a:rPr>
-              <a:t>Change</a:t>
-            </a:r>
-            <a:r>
-              <a:rPr lang="en-US" dirty="0" smtClean="0">
-                <a:solidFill>
-                  <a:srgbClr val="000000"/>
-                </a:solidFill>
-                <a:uFill>
-                  <a:solidFill>
-                    <a:srgbClr val="000000"/>
-                  </a:solidFill>
-                </a:uFill>
-              </a:rPr>
-              <a:t> working directory to where you want to save the repo</a:t>
-            </a:r>
-          </a:p>
-          <a:p>
-            <a:pPr marL="342900" lvl="8" indent="-342900" algn="l" rtl="0" latinLnBrk="1" hangingPunct="0">
-              <a:buFont typeface="Arial" panose="020B0604020202020204" pitchFamily="34" charset="0"/>
-              <a:buChar char="•"/>
-            </a:pPr>
-            <a:r>
-              <a:rPr lang="en-US" dirty="0" err="1">
-                <a:solidFill>
-                  <a:srgbClr val="000000"/>
-                </a:solidFill>
-                <a:uFill>
-                  <a:solidFill>
-                    <a:srgbClr val="000000"/>
-                  </a:solidFill>
-                </a:uFill>
-              </a:rPr>
-              <a:t>g</a:t>
-            </a:r>
-            <a:r>
-              <a:rPr lang="en-US" dirty="0" err="1" smtClean="0">
-                <a:solidFill>
-                  <a:srgbClr val="000000"/>
-                </a:solidFill>
-                <a:uFill>
-                  <a:solidFill>
-                    <a:srgbClr val="000000"/>
-                  </a:solidFill>
-                </a:uFill>
-              </a:rPr>
-              <a:t>it</a:t>
-            </a:r>
-            <a:r>
-              <a:rPr lang="en-US" dirty="0" smtClean="0">
-                <a:solidFill>
-                  <a:srgbClr val="000000"/>
-                </a:solidFill>
-                <a:uFill>
-                  <a:solidFill>
-                    <a:srgbClr val="000000"/>
-                  </a:solidFill>
-                </a:uFill>
-              </a:rPr>
-              <a:t> clone [</a:t>
-            </a:r>
-            <a:r>
-              <a:rPr lang="en-US" dirty="0" err="1" smtClean="0">
-                <a:solidFill>
-                  <a:srgbClr val="000000"/>
-                </a:solidFill>
-                <a:uFill>
-                  <a:solidFill>
-                    <a:srgbClr val="000000"/>
-                  </a:solidFill>
-                </a:uFill>
-              </a:rPr>
-              <a:t>url</a:t>
-            </a:r>
-            <a:r>
-              <a:rPr lang="en-US" dirty="0" smtClean="0">
-                <a:solidFill>
-                  <a:srgbClr val="000000"/>
-                </a:solidFill>
-                <a:uFill>
-                  <a:solidFill>
-                    <a:srgbClr val="000000"/>
-                  </a:solidFill>
-                </a:uFill>
-              </a:rPr>
-              <a:t> of repo]</a:t>
-            </a:r>
-          </a:p>
-          <a:p>
-            <a:pPr marL="342900" lvl="8" indent="-342900" algn="l" rtl="0" latinLnBrk="1" hangingPunct="0">
-              <a:buFont typeface="Arial" panose="020B0604020202020204" pitchFamily="34" charset="0"/>
-              <a:buChar char="•"/>
-            </a:pPr>
-            <a:r>
-              <a:rPr lang="en-US" dirty="0" smtClean="0">
-                <a:solidFill>
-                  <a:srgbClr val="000000"/>
-                </a:solidFill>
-                <a:uFill>
-                  <a:solidFill>
-                    <a:srgbClr val="000000"/>
-                  </a:solidFill>
-                </a:uFill>
-              </a:rPr>
-              <a:t>Hit enter </a:t>
-            </a:r>
-          </a:p>
-          <a:p>
-            <a:pPr marL="342900" lvl="8" indent="-342900" algn="l" rtl="0" latinLnBrk="1" hangingPunct="0">
-              <a:buFont typeface="Arial" panose="020B0604020202020204" pitchFamily="34" charset="0"/>
-              <a:buChar char="•"/>
-            </a:pPr>
-            <a:r>
-              <a:rPr lang="en-US" dirty="0" smtClean="0">
-                <a:solidFill>
-                  <a:srgbClr val="000000"/>
-                </a:solidFill>
-                <a:uFill>
-                  <a:solidFill>
-                    <a:srgbClr val="000000"/>
-                  </a:solidFill>
-                </a:uFill>
-              </a:rPr>
-              <a:t>Type password</a:t>
-            </a:r>
-          </a:p>
-          <a:p>
-            <a:pPr marL="342900" lvl="8" indent="-342900" algn="l" rtl="0" latinLnBrk="1" hangingPunct="0">
-              <a:buFont typeface="Arial" panose="020B0604020202020204" pitchFamily="34" charset="0"/>
-              <a:buChar char="•"/>
-            </a:pPr>
-            <a:r>
-              <a:rPr lang="en-US" dirty="0" smtClean="0">
-                <a:solidFill>
-                  <a:srgbClr val="000000"/>
-                </a:solidFill>
-                <a:uFill>
-                  <a:solidFill>
-                    <a:srgbClr val="000000"/>
-                  </a:solidFill>
-                </a:uFill>
-              </a:rPr>
-              <a:t>Repo is copied to a sub directory of working directory</a:t>
-            </a:r>
-          </a:p>
-          <a:p>
-            <a:pPr marL="342900" lvl="8" indent="-342900" algn="l" rtl="0" latinLnBrk="1" hangingPunct="0">
-              <a:buFont typeface="Arial" panose="020B0604020202020204" pitchFamily="34" charset="0"/>
-              <a:buChar char="•"/>
-            </a:pPr>
-            <a:endParaRPr kumimoji="0" lang="en-US" i="0" strike="noStrike" cap="none" spc="0" normalizeH="0" baseline="0" dirty="0">
-              <a:ln>
-                <a:noFill/>
-              </a:ln>
-              <a:solidFill>
-                <a:srgbClr val="000000"/>
-              </a:solidFill>
-              <a:effectLst/>
-              <a:uFill>
-                <a:solidFill>
-                  <a:srgbClr val="000000"/>
-                </a:solidFill>
-              </a:uFill>
-              <a:latin typeface="+mn-lt"/>
-              <a:ea typeface="+mn-ea"/>
-              <a:cs typeface="+mn-cs"/>
-              <a:sym typeface="News706BT-RomanC"/>
-            </a:endParaRPr>
-          </a:p>
-        </p:txBody>
-      </p:sp>
     </p:spTree>
     <p:extLst>
       <p:ext uri="{BB962C8B-B14F-4D97-AF65-F5344CB8AC3E}">
-        <p14:creationId xmlns:p14="http://schemas.microsoft.com/office/powerpoint/2010/main" val="1263139275"/>
+        <p14:creationId xmlns:p14="http://schemas.microsoft.com/office/powerpoint/2010/main" val="1368089763"/>
       </p:ext>
     </p:extLst>
   </p:cSld>
@@ -6333,6 +7578,276 @@
       </p:sp>
       <p:sp>
         <p:nvSpPr>
+          <p:cNvPr id="13" name="Shape 117"/>
+          <p:cNvSpPr/>
+          <p:nvPr/>
+        </p:nvSpPr>
+        <p:spPr>
+          <a:xfrm>
+            <a:off x="660400" y="50800"/>
+            <a:ext cx="11747500" cy="687048"/>
+          </a:xfrm>
+          <a:prstGeom prst="rect">
+            <a:avLst/>
+          </a:prstGeom>
+          <a:ln w="12700">
+            <a:miter lim="400000"/>
+          </a:ln>
+          <a:extLst>
+            <a:ext uri="{C572A759-6A51-4108-AA02-DFA0A04FC94B}">
+              <ma14:wrappingTextBoxFlag xmlns:ma14="http://schemas.microsoft.com/office/mac/drawingml/2011/main" xmlns="" val="1"/>
+            </a:ext>
+          </a:extLst>
+        </p:spPr>
+        <p:txBody>
+          <a:bodyPr lIns="0" tIns="0" rIns="0" bIns="0">
+            <a:spAutoFit/>
+          </a:bodyPr>
+          <a:lstStyle>
+            <a:lvl1pPr defTabSz="1524000">
+              <a:lnSpc>
+                <a:spcPct val="110000"/>
+              </a:lnSpc>
+              <a:buFont typeface="Lucida Grande"/>
+              <a:defRPr sz="2000"/>
+            </a:lvl1pPr>
+          </a:lstStyle>
+          <a:p>
+            <a:pPr lvl="0">
+              <a:defRPr sz="1800">
+                <a:uFillTx/>
+              </a:defRPr>
+            </a:pPr>
+            <a:r>
+              <a:rPr lang="en-US" sz="4400" b="1" dirty="0" smtClean="0"/>
+              <a:t>Basic Workflow</a:t>
+            </a:r>
+            <a:endParaRPr sz="4400" b="1" dirty="0">
+              <a:uFill>
+                <a:solidFill/>
+              </a:uFill>
+            </a:endParaRPr>
+          </a:p>
+        </p:txBody>
+      </p:sp>
+      <p:pic>
+        <p:nvPicPr>
+          <p:cNvPr id="9" name="Picture 2" descr="The lifecycle of the status of your files."/>
+          <p:cNvPicPr>
+            <a:picLocks noChangeAspect="1" noChangeArrowheads="1"/>
+          </p:cNvPicPr>
+          <p:nvPr/>
+        </p:nvPicPr>
+        <p:blipFill>
+          <a:blip r:embed="rId3">
+            <a:extLst>
+              <a:ext uri="{28A0092B-C50C-407E-A947-70E740481C1C}">
+                <a14:useLocalDpi xmlns:a14="http://schemas.microsoft.com/office/drawing/2010/main" val="0"/>
+              </a:ext>
+            </a:extLst>
+          </a:blip>
+          <a:srcRect/>
+          <a:stretch>
+            <a:fillRect/>
+          </a:stretch>
+        </p:blipFill>
+        <p:spPr bwMode="auto">
+          <a:xfrm>
+            <a:off x="863600" y="1993139"/>
+            <a:ext cx="10000857" cy="4128261"/>
+          </a:xfrm>
+          <a:prstGeom prst="rect">
+            <a:avLst/>
+          </a:prstGeom>
+          <a:noFill/>
+          <a:extLst>
+            <a:ext uri="{909E8E84-426E-40DD-AFC4-6F175D3DCCD1}">
+              <a14:hiddenFill xmlns:a14="http://schemas.microsoft.com/office/drawing/2010/main">
+                <a:solidFill>
+                  <a:srgbClr val="FFFFFF"/>
+                </a:solidFill>
+              </a14:hiddenFill>
+            </a:ext>
+          </a:extLst>
+        </p:spPr>
+      </p:pic>
+    </p:spTree>
+    <p:extLst>
+      <p:ext uri="{BB962C8B-B14F-4D97-AF65-F5344CB8AC3E}">
+        <p14:creationId xmlns:p14="http://schemas.microsoft.com/office/powerpoint/2010/main" val="1044721641"/>
+      </p:ext>
+    </p:extLst>
+  </p:cSld>
+  <p:clrMapOvr>
+    <a:masterClrMapping/>
+  </p:clrMapOvr>
+  <p:transition spd="med"/>
+  <p:timing>
+    <p:tnLst>
+      <p:par>
+        <p:cTn id="1" dur="indefinite" restart="never" nodeType="tmRoot"/>
+      </p:par>
+    </p:tnLst>
+  </p:timing>
+</p:sld>
+</file>
+
+<file path=ppt/slides/slide9.xml><?xml version="1.0" encoding="utf-8"?>
+<p:sld xmlns:a="http://schemas.openxmlformats.org/drawingml/2006/main" xmlns:r="http://schemas.openxmlformats.org/officeDocument/2006/relationships" xmlns:p="http://schemas.openxmlformats.org/presentationml/2006/main">
+  <p:cSld>
+    <p:spTree>
+      <p:nvGrpSpPr>
+        <p:cNvPr id="1" name=""/>
+        <p:cNvGrpSpPr/>
+        <p:nvPr/>
+      </p:nvGrpSpPr>
+      <p:grpSpPr>
+        <a:xfrm>
+          <a:off x="0" y="0"/>
+          <a:ext cx="0" cy="0"/>
+          <a:chOff x="0" y="0"/>
+          <a:chExt cx="0" cy="0"/>
+        </a:xfrm>
+      </p:grpSpPr>
+      <p:sp>
+        <p:nvSpPr>
+          <p:cNvPr id="114" name="Shape 114"/>
+          <p:cNvSpPr/>
+          <p:nvPr/>
+        </p:nvSpPr>
+        <p:spPr>
+          <a:xfrm>
+            <a:off x="660400" y="7566699"/>
+            <a:ext cx="5727700" cy="145874"/>
+          </a:xfrm>
+          <a:prstGeom prst="rect">
+            <a:avLst/>
+          </a:prstGeom>
+          <a:ln w="12700">
+            <a:miter lim="400000"/>
+          </a:ln>
+          <a:extLst>
+            <a:ext uri="{C572A759-6A51-4108-AA02-DFA0A04FC94B}">
+              <ma14:wrappingTextBoxFlag xmlns:ma14="http://schemas.microsoft.com/office/mac/drawingml/2011/main" xmlns="" val="1"/>
+            </a:ext>
+          </a:extLst>
+        </p:spPr>
+        <p:txBody>
+          <a:bodyPr lIns="0" tIns="0" rIns="0" bIns="0">
+            <a:spAutoFit/>
+          </a:bodyPr>
+          <a:lstStyle>
+            <a:lvl1pPr defTabSz="495300">
+              <a:lnSpc>
+                <a:spcPct val="65000"/>
+              </a:lnSpc>
+              <a:defRPr sz="1400" cap="all" spc="-28">
+                <a:uFillTx/>
+                <a:latin typeface="PFDinTextCompPro-Bold"/>
+                <a:ea typeface="PFDinTextCompPro-Bold"/>
+                <a:cs typeface="PFDinTextCompPro-Bold"/>
+                <a:sym typeface="PFDinTextCompPro-Bold"/>
+              </a:defRPr>
+            </a:lvl1pPr>
+          </a:lstStyle>
+          <a:p>
+            <a:pPr lvl="0">
+              <a:defRPr sz="1800" cap="none" spc="0"/>
+            </a:pPr>
+            <a:r>
+              <a:rPr sz="1400" cap="all" spc="-28" dirty="0"/>
+              <a:t>data </a:t>
+            </a:r>
+            <a:r>
+              <a:rPr sz="1400" cap="all" spc="-28" dirty="0" smtClean="0"/>
+              <a:t>science</a:t>
+            </a:r>
+            <a:endParaRPr sz="1400" cap="all" spc="-28" dirty="0"/>
+          </a:p>
+        </p:txBody>
+      </p:sp>
+      <p:pic>
+        <p:nvPicPr>
+          <p:cNvPr id="115" name="GA_secondary_cog_bw.pdf"/>
+          <p:cNvPicPr/>
+          <p:nvPr/>
+        </p:nvPicPr>
+        <p:blipFill>
+          <a:blip r:embed="rId2">
+            <a:extLst/>
+          </a:blip>
+          <a:stretch>
+            <a:fillRect/>
+          </a:stretch>
+        </p:blipFill>
+        <p:spPr>
+          <a:xfrm>
+            <a:off x="12052300" y="7581900"/>
+            <a:ext cx="332576" cy="330200"/>
+          </a:xfrm>
+          <a:prstGeom prst="rect">
+            <a:avLst/>
+          </a:prstGeom>
+          <a:ln w="12700">
+            <a:miter lim="400000"/>
+          </a:ln>
+        </p:spPr>
+      </p:pic>
+      <p:sp>
+        <p:nvSpPr>
+          <p:cNvPr id="116" name="Shape 116"/>
+          <p:cNvSpPr/>
+          <p:nvPr/>
+        </p:nvSpPr>
+        <p:spPr>
+          <a:xfrm>
+            <a:off x="444500" y="2438399"/>
+            <a:ext cx="11129368" cy="421590"/>
+          </a:xfrm>
+          <a:prstGeom prst="rect">
+            <a:avLst/>
+          </a:prstGeom>
+          <a:ln w="12700">
+            <a:miter lim="400000"/>
+          </a:ln>
+          <a:extLst>
+            <a:ext uri="{C572A759-6A51-4108-AA02-DFA0A04FC94B}">
+              <ma14:wrappingTextBoxFlag xmlns:ma14="http://schemas.microsoft.com/office/mac/drawingml/2011/main" xmlns="" val="1"/>
+            </a:ext>
+          </a:extLst>
+        </p:spPr>
+        <p:txBody>
+          <a:bodyPr lIns="0" tIns="0" rIns="0" bIns="0">
+            <a:spAutoFit/>
+          </a:bodyPr>
+          <a:lstStyle/>
+          <a:p>
+            <a:pPr lvl="0" defTabSz="1524000">
+              <a:lnSpc>
+                <a:spcPct val="110000"/>
+              </a:lnSpc>
+              <a:spcBef>
+                <a:spcPts val="500"/>
+              </a:spcBef>
+              <a:buFont typeface="Lucida Grande"/>
+              <a:defRPr sz="1800">
+                <a:uFillTx/>
+              </a:defRPr>
+            </a:pPr>
+            <a:endParaRPr sz="2700" cap="all" spc="-53" dirty="0">
+              <a:uFill>
+                <a:solidFill/>
+              </a:uFill>
+              <a:latin typeface="Helvetica"/>
+              <a:ea typeface="Helvetica"/>
+              <a:cs typeface="Helvetica"/>
+              <a:sym typeface="Helvetica"/>
+            </a:endParaRPr>
+          </a:p>
+        </p:txBody>
+      </p:sp>
+      <p:sp>
+        <p:nvSpPr>
           <p:cNvPr id="117" name="Shape 117"/>
           <p:cNvSpPr/>
           <p:nvPr/>
@@ -6397,8 +7912,8 @@
         </p:nvSpPr>
         <p:spPr>
           <a:xfrm>
-            <a:off x="540938" y="1083733"/>
-            <a:ext cx="11940376" cy="5486400"/>
+            <a:off x="417912" y="1397000"/>
+            <a:ext cx="11940376" cy="5867400"/>
           </a:xfrm>
           <a:prstGeom prst="rect">
             <a:avLst/>
@@ -6428,100 +7943,6 @@
           </a:bodyPr>
           <a:lstStyle/>
           <a:p>
-            <a:pPr algn="l" rtl="0" latinLnBrk="1" hangingPunct="0"/>
-            <a:r>
-              <a:rPr lang="en-US" b="1" u="sng" dirty="0" smtClean="0">
-                <a:solidFill>
-                  <a:srgbClr val="000000"/>
-                </a:solidFill>
-                <a:uFill>
-                  <a:solidFill>
-                    <a:srgbClr val="000000"/>
-                  </a:solidFill>
-                </a:uFill>
-              </a:rPr>
-              <a:t>Status</a:t>
-            </a:r>
-            <a:r>
-              <a:rPr lang="en-US" dirty="0" smtClean="0">
-                <a:solidFill>
-                  <a:srgbClr val="000000"/>
-                </a:solidFill>
-                <a:uFill>
-                  <a:solidFill>
-                    <a:srgbClr val="000000"/>
-                  </a:solidFill>
-                </a:uFill>
-              </a:rPr>
-              <a:t>: Status of files (tracked, untracked, modified or not)</a:t>
-            </a:r>
-            <a:endParaRPr lang="en-US" dirty="0">
-              <a:solidFill>
-                <a:srgbClr val="000000"/>
-              </a:solidFill>
-              <a:uFill>
-                <a:solidFill>
-                  <a:srgbClr val="000000"/>
-                </a:solidFill>
-              </a:uFill>
-            </a:endParaRPr>
-          </a:p>
-          <a:p>
-            <a:pPr marL="342900" lvl="8" indent="-342900" algn="l" rtl="0" latinLnBrk="1" hangingPunct="0">
-              <a:buFont typeface="Arial" panose="020B0604020202020204" pitchFamily="34" charset="0"/>
-              <a:buChar char="•"/>
-            </a:pPr>
-            <a:r>
-              <a:rPr lang="en-US" dirty="0" err="1">
-                <a:solidFill>
-                  <a:srgbClr val="000000"/>
-                </a:solidFill>
-                <a:uFill>
-                  <a:solidFill>
-                    <a:srgbClr val="000000"/>
-                  </a:solidFill>
-                </a:uFill>
-              </a:rPr>
-              <a:t>g</a:t>
-            </a:r>
-            <a:r>
-              <a:rPr lang="en-US" dirty="0" err="1" smtClean="0">
-                <a:solidFill>
-                  <a:srgbClr val="000000"/>
-                </a:solidFill>
-                <a:uFill>
-                  <a:solidFill>
-                    <a:srgbClr val="000000"/>
-                  </a:solidFill>
-                </a:uFill>
-              </a:rPr>
-              <a:t>it</a:t>
-            </a:r>
-            <a:r>
-              <a:rPr lang="en-US" dirty="0" smtClean="0">
-                <a:solidFill>
-                  <a:srgbClr val="000000"/>
-                </a:solidFill>
-                <a:uFill>
-                  <a:solidFill>
-                    <a:srgbClr val="000000"/>
-                  </a:solidFill>
-                </a:uFill>
-              </a:rPr>
-              <a:t> status</a:t>
-            </a:r>
-            <a:endParaRPr lang="en-US" b="1" u="sng" dirty="0" smtClean="0">
-              <a:solidFill>
-                <a:srgbClr val="000000"/>
-              </a:solidFill>
-              <a:uFill>
-                <a:solidFill>
-                  <a:srgbClr val="000000"/>
-                </a:solidFill>
-              </a:uFill>
-            </a:endParaRPr>
-          </a:p>
-          <a:p>
             <a:pPr marR="0" algn="l" defTabSz="1435100" rtl="0" fontAlgn="auto" latinLnBrk="1" hangingPunct="0">
               <a:lnSpc>
                 <a:spcPct val="100000"/>
@@ -6537,20 +7958,7 @@
               <a:tabLst/>
             </a:pPr>
             <a:r>
-              <a:rPr lang="en-US" b="1" u="sng" dirty="0" smtClean="0">
-                <a:solidFill>
-                  <a:srgbClr val="000000"/>
-                </a:solidFill>
-                <a:uFill>
-                  <a:solidFill>
-                    <a:srgbClr val="000000"/>
-                  </a:solidFill>
-                </a:uFill>
-              </a:rPr>
-              <a:t>Staging</a:t>
-            </a:r>
-            <a:r>
-              <a:rPr kumimoji="0" lang="en-US" sz="2200" b="0" i="0" u="none" strike="noStrike" cap="none" spc="0" normalizeH="0" baseline="0" dirty="0" smtClean="0">
+              <a:rPr kumimoji="0" lang="en-US" sz="2200" b="1" i="0" u="sng" strike="noStrike" cap="none" spc="0" normalizeH="0" baseline="0" dirty="0" smtClean="0">
                 <a:ln>
                   <a:noFill/>
                 </a:ln>
@@ -6568,10 +7976,10 @@
                 <a:cs typeface="+mn-cs"/>
                 <a:sym typeface="News706BT-RomanC"/>
               </a:rPr>
-              <a:t>: Prepping</a:t>
-            </a:r>
-            <a:r>
-              <a:rPr kumimoji="0" lang="en-US" sz="2200" b="0" i="0" u="none" strike="noStrike" cap="none" spc="0" normalizeH="0" dirty="0" smtClean="0">
+              <a:t>Fork a repo</a:t>
+            </a:r>
+            <a:r>
+              <a:rPr kumimoji="0" lang="en-US" sz="2200" b="0" i="0" u="none" strike="noStrike" cap="none" spc="0" normalizeH="0" baseline="0" dirty="0" smtClean="0">
                 <a:ln>
                   <a:noFill/>
                 </a:ln>
@@ -6589,10 +7997,16 @@
                 <a:cs typeface="+mn-cs"/>
                 <a:sym typeface="News706BT-RomanC"/>
               </a:rPr>
-              <a:t> files for committing</a:t>
-            </a:r>
-            <a:r>
-              <a:rPr kumimoji="0" lang="en-US" sz="2200" b="0" i="0" u="none" strike="noStrike" cap="none" spc="0" normalizeH="0" baseline="0" dirty="0" smtClean="0">
+              <a:t>: Make a copy of a repo in your account. </a:t>
+            </a:r>
+          </a:p>
+          <a:p>
+            <a:pPr marL="342900" lvl="8" indent="-342900" algn="l" rtl="0" latinLnBrk="1" hangingPunct="0">
+              <a:buFont typeface="Arial" panose="020B0604020202020204" pitchFamily="34" charset="0"/>
+              <a:buChar char="•"/>
+            </a:pPr>
+            <a:r>
+              <a:rPr kumimoji="0" lang="en-US" b="0" i="0" u="none" strike="noStrike" cap="none" spc="0" normalizeH="0" baseline="0" dirty="0" smtClean="0">
                 <a:ln>
                   <a:noFill/>
                 </a:ln>
@@ -6610,7 +8024,7 @@
                 <a:cs typeface="+mn-cs"/>
                 <a:sym typeface="News706BT-RomanC"/>
               </a:rPr>
-              <a:t>. </a:t>
+              <a:t>Log into GitHub</a:t>
             </a:r>
           </a:p>
           <a:p>
@@ -6619,7 +8033,7 @@
               <a:buChar char="•"/>
             </a:pPr>
             <a:r>
-              <a:rPr lang="en-US" dirty="0" err="1">
+              <a:rPr lang="en-US" dirty="0">
                 <a:solidFill>
                   <a:srgbClr val="000000"/>
                 </a:solidFill>
@@ -6629,55 +8043,10 @@
                   </a:solidFill>
                 </a:uFill>
               </a:rPr>
-              <a:t>g</a:t>
-            </a:r>
-            <a:r>
-              <a:rPr lang="en-US" dirty="0" err="1" smtClean="0">
-                <a:solidFill>
-                  <a:srgbClr val="000000"/>
-                </a:solidFill>
-                <a:uFill>
-                  <a:solidFill>
-                    <a:srgbClr val="000000"/>
-                  </a:solidFill>
-                </a:uFill>
-              </a:rPr>
-              <a:t>it</a:t>
-            </a:r>
-            <a:r>
-              <a:rPr lang="en-US" dirty="0" smtClean="0">
-                <a:solidFill>
-                  <a:srgbClr val="000000"/>
-                </a:solidFill>
-                <a:uFill>
-                  <a:solidFill>
-                    <a:srgbClr val="000000"/>
-                  </a:solidFill>
-                </a:uFill>
-              </a:rPr>
-              <a:t> add filename</a:t>
-            </a:r>
-          </a:p>
-          <a:p>
-            <a:pPr marL="342900" lvl="8" indent="-342900" algn="l" rtl="0" latinLnBrk="1" hangingPunct="0">
-              <a:buFont typeface="Arial" panose="020B0604020202020204" pitchFamily="34" charset="0"/>
-              <a:buChar char="•"/>
-            </a:pPr>
-            <a:r>
-              <a:rPr lang="en-US" dirty="0" err="1">
-                <a:solidFill>
-                  <a:srgbClr val="000000"/>
-                </a:solidFill>
-                <a:uFill>
-                  <a:solidFill>
-                    <a:srgbClr val="000000"/>
-                  </a:solidFill>
-                </a:uFill>
-              </a:rPr>
-              <a:t>g</a:t>
-            </a:r>
-            <a:r>
-              <a:rPr kumimoji="0" lang="en-US" b="0" i="0" u="none" strike="noStrike" cap="none" spc="0" normalizeH="0" baseline="0" dirty="0" err="1" smtClean="0">
+              <a:t>G</a:t>
+            </a:r>
+            <a:r>
+              <a:rPr kumimoji="0" lang="en-US" b="0" i="0" u="none" strike="noStrike" cap="none" spc="0" normalizeH="0" baseline="0" dirty="0" smtClean="0">
                 <a:ln>
                   <a:noFill/>
                 </a:ln>
@@ -6695,10 +8064,39 @@
                 <a:cs typeface="+mn-cs"/>
                 <a:sym typeface="News706BT-RomanC"/>
               </a:rPr>
-              <a:t>it</a:t>
-            </a:r>
-            <a:r>
-              <a:rPr kumimoji="0" lang="en-US" b="0" i="0" u="none" strike="noStrike" cap="none" spc="0" normalizeH="0" baseline="0" dirty="0" smtClean="0">
+              <a:t>o to repository</a:t>
+            </a:r>
+            <a:endParaRPr lang="en-US" dirty="0">
+              <a:solidFill>
+                <a:srgbClr val="000000"/>
+              </a:solidFill>
+              <a:uFill>
+                <a:solidFill>
+                  <a:srgbClr val="000000"/>
+                </a:solidFill>
+              </a:uFill>
+            </a:endParaRPr>
+          </a:p>
+          <a:p>
+            <a:pPr marL="342900" lvl="8" indent="-342900" algn="l" rtl="0" latinLnBrk="1" hangingPunct="0">
+              <a:buFont typeface="Arial" panose="020B0604020202020204" pitchFamily="34" charset="0"/>
+              <a:buChar char="•"/>
+            </a:pPr>
+            <a:r>
+              <a:rPr lang="en-US" dirty="0">
+                <a:solidFill>
+                  <a:srgbClr val="000000"/>
+                </a:solidFill>
+                <a:uFill>
+                  <a:solidFill>
+                    <a:srgbClr val="000000"/>
+                  </a:solidFill>
+                </a:uFill>
+              </a:rPr>
+              <a:t>C</a:t>
+            </a:r>
+            <a:r>
+              <a:rPr kumimoji="0" lang="en-US" b="0" i="0" u="none" strike="noStrike" cap="none" spc="0" normalizeH="0" dirty="0" smtClean="0">
                 <a:ln>
                   <a:noFill/>
                 </a:ln>
@@ -6716,31 +8114,42 @@
                 <a:cs typeface="+mn-cs"/>
                 <a:sym typeface="News706BT-RomanC"/>
               </a:rPr>
-              <a:t> add .</a:t>
-            </a:r>
-            <a:endParaRPr kumimoji="0" lang="en-US" b="0" i="0" u="none" strike="noStrike" cap="none" spc="0" normalizeH="0" baseline="0" dirty="0" smtClean="0">
-              <a:ln>
-                <a:noFill/>
-              </a:ln>
-              <a:solidFill>
-                <a:srgbClr val="000000"/>
-              </a:solidFill>
-              <a:effectLst/>
-              <a:uFill>
+              <a:t>lick fork</a:t>
+            </a:r>
+          </a:p>
+          <a:p>
+            <a:pPr lvl="8" indent="0" algn="l" rtl="0" latinLnBrk="1" hangingPunct="0"/>
+            <a:r>
+              <a:rPr lang="en-US" b="1" u="sng" baseline="0" dirty="0" smtClean="0">
                 <a:solidFill>
                   <a:srgbClr val="000000"/>
                 </a:solidFill>
-              </a:uFill>
-              <a:latin typeface="+mn-lt"/>
-              <a:ea typeface="+mn-ea"/>
-              <a:cs typeface="+mn-cs"/>
-              <a:sym typeface="News706BT-RomanC"/>
-            </a:endParaRPr>
+                <a:uFill>
+                  <a:solidFill>
+                    <a:srgbClr val="000000"/>
+                  </a:solidFill>
+                </a:uFill>
+              </a:rPr>
+              <a:t>Pull: </a:t>
+            </a:r>
+            <a:r>
+              <a:rPr lang="en-US" baseline="0" dirty="0" smtClean="0">
+                <a:solidFill>
+                  <a:srgbClr val="000000"/>
+                </a:solidFill>
+                <a:uFill>
+                  <a:solidFill>
+                    <a:srgbClr val="000000"/>
+                  </a:solidFill>
+                </a:uFill>
+              </a:rPr>
+              <a:t>Pull your changes into a repo</a:t>
+            </a:r>
           </a:p>
           <a:p>
             <a:pPr lvl="8" indent="0" algn="l" rtl="0" latinLnBrk="1" hangingPunct="0"/>
             <a:r>
-              <a:rPr kumimoji="0" lang="en-US" b="1" i="0" u="sng" strike="noStrike" cap="none" spc="0" normalizeH="0" baseline="0" dirty="0" err="1" smtClean="0">
+              <a:rPr kumimoji="0" lang="en-US" b="1" i="0" u="sng" strike="noStrike" cap="none" spc="0" normalizeH="0" dirty="0" smtClean="0">
                 <a:ln>
                   <a:noFill/>
                 </a:ln>
@@ -6758,10 +8167,48 @@
                 <a:cs typeface="+mn-cs"/>
                 <a:sym typeface="News706BT-RomanC"/>
               </a:rPr>
-              <a:t>Commiting</a:t>
-            </a:r>
-            <a:r>
-              <a:rPr kumimoji="0" lang="en-US" b="1" i="0" u="sng" strike="noStrike" cap="none" spc="0" normalizeH="0" baseline="0" dirty="0" smtClean="0">
+              <a:t>Create a new repository</a:t>
+            </a:r>
+          </a:p>
+          <a:p>
+            <a:pPr marL="342900" lvl="8" indent="-342900" algn="l" rtl="0" latinLnBrk="1" hangingPunct="0">
+              <a:buFont typeface="Arial" panose="020B0604020202020204" pitchFamily="34" charset="0"/>
+              <a:buChar char="•"/>
+            </a:pPr>
+            <a:r>
+              <a:rPr lang="en-US" baseline="0" dirty="0" smtClean="0">
+                <a:solidFill>
+                  <a:srgbClr val="000000"/>
+                </a:solidFill>
+                <a:uFill>
+                  <a:solidFill>
+                    <a:srgbClr val="000000"/>
+                  </a:solidFill>
+                </a:uFill>
+              </a:rPr>
+              <a:t>Click on + then new repository</a:t>
+            </a:r>
+            <a:r>
+              <a:rPr lang="en-US" dirty="0" smtClean="0">
+                <a:solidFill>
+                  <a:srgbClr val="000000"/>
+                </a:solidFill>
+                <a:uFill>
+                  <a:solidFill>
+                    <a:srgbClr val="000000"/>
+                  </a:solidFill>
+                </a:uFill>
+              </a:rPr>
+              <a:t> </a:t>
+            </a:r>
+          </a:p>
+          <a:p>
+            <a:pPr marL="342900" lvl="8" indent="-342900" algn="l" rtl="0" latinLnBrk="1" hangingPunct="0">
+              <a:buFont typeface="Arial" panose="020B0604020202020204" pitchFamily="34" charset="0"/>
+              <a:buChar char="•"/>
+            </a:pPr>
+            <a:r>
+              <a:rPr kumimoji="0" lang="en-US" i="0" strike="noStrike" cap="none" spc="0" normalizeH="0" baseline="0" dirty="0" smtClean="0">
                 <a:ln>
                   <a:noFill/>
                 </a:ln>
@@ -6779,115 +8226,10 @@
                 <a:cs typeface="+mn-cs"/>
                 <a:sym typeface="News706BT-RomanC"/>
               </a:rPr>
-              <a:t>:</a:t>
-            </a:r>
-            <a:r>
-              <a:rPr lang="en-US" dirty="0">
-                <a:solidFill>
-                  <a:srgbClr val="000000"/>
-                </a:solidFill>
-                <a:uFill>
-                  <a:solidFill>
-                    <a:srgbClr val="000000"/>
-                  </a:solidFill>
-                </a:uFill>
-              </a:rPr>
-              <a:t> </a:t>
-            </a:r>
-            <a:r>
-              <a:rPr lang="en-US" dirty="0" smtClean="0">
-                <a:solidFill>
-                  <a:srgbClr val="000000"/>
-                </a:solidFill>
-                <a:uFill>
-                  <a:solidFill>
-                    <a:srgbClr val="000000"/>
-                  </a:solidFill>
-                </a:uFill>
-              </a:rPr>
-              <a:t>Committing the changes to </a:t>
-            </a:r>
-            <a:r>
-              <a:rPr lang="en-US" dirty="0" err="1" smtClean="0">
-                <a:solidFill>
-                  <a:srgbClr val="000000"/>
-                </a:solidFill>
-                <a:uFill>
-                  <a:solidFill>
-                    <a:srgbClr val="000000"/>
-                  </a:solidFill>
-                </a:uFill>
-              </a:rPr>
-              <a:t>Git</a:t>
-            </a:r>
-            <a:endParaRPr kumimoji="0" lang="en-US" i="0" strike="noStrike" cap="none" spc="0" normalizeH="0" dirty="0" smtClean="0">
-              <a:ln>
-                <a:noFill/>
-              </a:ln>
-              <a:solidFill>
-                <a:srgbClr val="000000"/>
-              </a:solidFill>
-              <a:effectLst/>
-              <a:uFill>
-                <a:solidFill>
-                  <a:srgbClr val="000000"/>
-                </a:solidFill>
-              </a:uFill>
-              <a:latin typeface="+mn-lt"/>
-              <a:ea typeface="+mn-ea"/>
-              <a:cs typeface="+mn-cs"/>
-              <a:sym typeface="News706BT-RomanC"/>
-            </a:endParaRPr>
-          </a:p>
-          <a:p>
-            <a:pPr marL="342900" lvl="8" indent="-342900" algn="l" rtl="0" latinLnBrk="1" hangingPunct="0">
-              <a:buFont typeface="Arial" panose="020B0604020202020204" pitchFamily="34" charset="0"/>
-              <a:buChar char="•"/>
-            </a:pPr>
-            <a:r>
-              <a:rPr lang="en-US" dirty="0" err="1">
-                <a:solidFill>
-                  <a:srgbClr val="000000"/>
-                </a:solidFill>
-                <a:uFill>
-                  <a:solidFill>
-                    <a:srgbClr val="000000"/>
-                  </a:solidFill>
-                </a:uFill>
-              </a:rPr>
-              <a:t>g</a:t>
-            </a:r>
-            <a:r>
-              <a:rPr lang="en-US" baseline="0" dirty="0" err="1" smtClean="0">
-                <a:solidFill>
-                  <a:srgbClr val="000000"/>
-                </a:solidFill>
-                <a:uFill>
-                  <a:solidFill>
-                    <a:srgbClr val="000000"/>
-                  </a:solidFill>
-                </a:uFill>
-              </a:rPr>
-              <a:t>it</a:t>
-            </a:r>
-            <a:r>
-              <a:rPr lang="en-US" dirty="0" smtClean="0">
-                <a:solidFill>
-                  <a:srgbClr val="000000"/>
-                </a:solidFill>
-                <a:uFill>
-                  <a:solidFill>
-                    <a:srgbClr val="000000"/>
-                  </a:solidFill>
-                </a:uFill>
-              </a:rPr>
-              <a:t> commit –m “Comment for the commit”</a:t>
-            </a:r>
-          </a:p>
-          <a:p>
-            <a:pPr lvl="8" indent="0" algn="l" rtl="0" latinLnBrk="1" hangingPunct="0"/>
-            <a:r>
-              <a:rPr kumimoji="0" lang="en-US" b="1" i="0" u="sng" strike="noStrike" cap="none" spc="0" normalizeH="0" baseline="0" dirty="0" smtClean="0">
+              <a:t>Choose</a:t>
+            </a:r>
+            <a:r>
+              <a:rPr kumimoji="0" lang="en-US" i="0" strike="noStrike" cap="none" spc="0" normalizeH="0" dirty="0" smtClean="0">
                 <a:ln>
                   <a:noFill/>
                 </a:ln>
@@ -6905,10 +8247,16 @@
                 <a:cs typeface="+mn-cs"/>
                 <a:sym typeface="News706BT-RomanC"/>
               </a:rPr>
-              <a:t>Log:</a:t>
-            </a:r>
-            <a:r>
-              <a:rPr lang="en-US" dirty="0">
+              <a:t> name and description</a:t>
+            </a:r>
+          </a:p>
+          <a:p>
+            <a:pPr marL="342900" lvl="8" indent="-342900" algn="l" rtl="0" latinLnBrk="1" hangingPunct="0">
+              <a:buFont typeface="Arial" panose="020B0604020202020204" pitchFamily="34" charset="0"/>
+              <a:buChar char="•"/>
+            </a:pPr>
+            <a:r>
+              <a:rPr lang="en-US" baseline="0" dirty="0" smtClean="0">
                 <a:solidFill>
                   <a:srgbClr val="000000"/>
                 </a:solidFill>
@@ -6918,8 +8266,14 @@
                   </a:solidFill>
                 </a:uFill>
               </a:rPr>
-              <a:t> </a:t>
-            </a:r>
+              <a:t>Public</a:t>
+            </a:r>
+          </a:p>
+          <a:p>
+            <a:pPr marL="342900" lvl="8" indent="-342900" algn="l" rtl="0" latinLnBrk="1" hangingPunct="0">
+              <a:buFont typeface="Arial" panose="020B0604020202020204" pitchFamily="34" charset="0"/>
+              <a:buChar char="•"/>
+            </a:pPr>
             <a:r>
               <a:rPr lang="en-US" dirty="0" smtClean="0">
                 <a:solidFill>
@@ -6931,7 +8285,7 @@
                   </a:solidFill>
                 </a:uFill>
               </a:rPr>
-              <a:t>Log of changes</a:t>
+              <a:t>Initial readme</a:t>
             </a:r>
           </a:p>
           <a:p>
@@ -6940,20 +8294,7 @@
               <a:buChar char="•"/>
             </a:pPr>
             <a:r>
-              <a:rPr lang="en-US" dirty="0" err="1">
-                <a:solidFill>
-                  <a:srgbClr val="000000"/>
-                </a:solidFill>
-                <a:uFill>
-                  <a:solidFill>
-                    <a:srgbClr val="000000"/>
-                  </a:solidFill>
-                </a:uFill>
-              </a:rPr>
-              <a:t>g</a:t>
-            </a:r>
-            <a:r>
-              <a:rPr kumimoji="0" lang="en-US" i="0" strike="noStrike" cap="none" spc="0" normalizeH="0" baseline="0" dirty="0" err="1" smtClean="0">
+              <a:rPr kumimoji="0" lang="en-US" i="0" strike="noStrike" cap="none" spc="0" normalizeH="0" baseline="0" dirty="0" smtClean="0">
                 <a:ln>
                   <a:noFill/>
                 </a:ln>
@@ -6971,7 +8312,7 @@
                 <a:cs typeface="+mn-cs"/>
                 <a:sym typeface="News706BT-RomanC"/>
               </a:rPr>
-              <a:t>it</a:t>
+              <a:t>Click</a:t>
             </a:r>
             <a:r>
               <a:rPr kumimoji="0" lang="en-US" i="0" strike="noStrike" cap="none" spc="0" normalizeH="0" dirty="0" smtClean="0">
@@ -6992,7 +8333,7 @@
                 <a:cs typeface="+mn-cs"/>
                 <a:sym typeface="News706BT-RomanC"/>
               </a:rPr>
-              <a:t> log</a:t>
+              <a:t> create</a:t>
             </a:r>
           </a:p>
           <a:p>
@@ -7008,33 +8349,7 @@
                   </a:solidFill>
                 </a:uFill>
               </a:rPr>
-              <a:t>Push:</a:t>
-            </a:r>
-            <a:r>
-              <a:rPr lang="en-US" baseline="0" dirty="0" smtClean="0">
-                <a:solidFill>
-                  <a:srgbClr val="000000"/>
-                </a:solidFill>
-                <a:uFill>
-                  <a:solidFill>
-                    <a:srgbClr val="000000"/>
-                  </a:solidFill>
-                </a:uFill>
-              </a:rPr>
-              <a:t> Push</a:t>
-            </a:r>
-            <a:r>
-              <a:rPr lang="en-US" dirty="0" smtClean="0">
-                <a:solidFill>
-                  <a:srgbClr val="000000"/>
-                </a:solidFill>
-                <a:uFill>
-                  <a:solidFill>
-                    <a:srgbClr val="000000"/>
-                  </a:solidFill>
-                </a:uFill>
-              </a:rPr>
-              <a:t> the changes to the GitHub repo</a:t>
+              <a:t>Copying repo to local computer:</a:t>
             </a:r>
           </a:p>
           <a:p>
@@ -7043,20 +8358,7 @@
               <a:buChar char="•"/>
             </a:pPr>
             <a:r>
-              <a:rPr lang="en-US" dirty="0" err="1">
-                <a:solidFill>
-                  <a:srgbClr val="000000"/>
-                </a:solidFill>
-                <a:uFill>
-                  <a:solidFill>
-                    <a:srgbClr val="000000"/>
-                  </a:solidFill>
-                </a:uFill>
-              </a:rPr>
-              <a:t>g</a:t>
-            </a:r>
-            <a:r>
-              <a:rPr kumimoji="0" lang="en-US" i="0" strike="noStrike" cap="none" spc="0" normalizeH="0" baseline="0" dirty="0" err="1" smtClean="0">
+              <a:rPr kumimoji="0" lang="en-US" i="0" strike="noStrike" cap="none" spc="0" normalizeH="0" dirty="0" smtClean="0">
                 <a:ln>
                   <a:noFill/>
                 </a:ln>
@@ -7074,10 +8376,10 @@
                 <a:cs typeface="+mn-cs"/>
                 <a:sym typeface="News706BT-RomanC"/>
               </a:rPr>
-              <a:t>it</a:t>
-            </a:r>
-            <a:r>
-              <a:rPr kumimoji="0" lang="en-US" i="0" strike="noStrike" cap="none" spc="0" normalizeH="0" dirty="0" smtClean="0">
+              <a:t>Open </a:t>
+            </a:r>
+            <a:r>
+              <a:rPr kumimoji="0" lang="en-US" i="0" strike="noStrike" cap="none" spc="0" normalizeH="0" dirty="0" err="1" smtClean="0">
                 <a:ln>
                   <a:noFill/>
                 </a:ln>
@@ -7095,33 +8397,8 @@
                 <a:cs typeface="+mn-cs"/>
                 <a:sym typeface="News706BT-RomanC"/>
               </a:rPr>
-              <a:t> push origin master</a:t>
-            </a:r>
-          </a:p>
-          <a:p>
-            <a:pPr marL="342900" lvl="8" indent="-342900" algn="l" rtl="0" latinLnBrk="1" hangingPunct="0">
-              <a:buFont typeface="Arial" panose="020B0604020202020204" pitchFamily="34" charset="0"/>
-              <a:buChar char="•"/>
-            </a:pPr>
-            <a:r>
-              <a:rPr lang="en-US" baseline="0" dirty="0" smtClean="0">
-                <a:solidFill>
-                  <a:srgbClr val="000000"/>
-                </a:solidFill>
-                <a:uFill>
-                  <a:solidFill>
-                    <a:srgbClr val="000000"/>
-                  </a:solidFill>
-                </a:uFill>
-              </a:rPr>
-              <a:t>Push master branch to the origin remote</a:t>
-            </a:r>
-          </a:p>
-          <a:p>
-            <a:pPr marL="342900" lvl="8" indent="-342900" algn="l" rtl="0" latinLnBrk="1" hangingPunct="0">
-              <a:buFont typeface="Arial" panose="020B0604020202020204" pitchFamily="34" charset="0"/>
-              <a:buChar char="•"/>
-            </a:pPr>
+              <a:t>git</a:t>
+            </a:r>
             <a:r>
               <a:rPr kumimoji="0" lang="en-US" i="0" strike="noStrike" cap="none" spc="0" normalizeH="0" dirty="0" smtClean="0">
                 <a:ln>
@@ -7141,8 +8418,174 @@
                 <a:cs typeface="+mn-cs"/>
                 <a:sym typeface="News706BT-RomanC"/>
               </a:rPr>
-              <a:t>Type password and you’re done</a:t>
-            </a:r>
+              <a:t>, terminal</a:t>
+            </a:r>
+          </a:p>
+          <a:p>
+            <a:pPr marL="342900" lvl="8" indent="-342900" algn="l" rtl="0" latinLnBrk="1" hangingPunct="0">
+              <a:buFont typeface="Arial" panose="020B0604020202020204" pitchFamily="34" charset="0"/>
+              <a:buChar char="•"/>
+            </a:pPr>
+            <a:r>
+              <a:rPr lang="en-US" baseline="0" dirty="0" smtClean="0">
+                <a:solidFill>
+                  <a:srgbClr val="000000"/>
+                </a:solidFill>
+                <a:uFill>
+                  <a:solidFill>
+                    <a:srgbClr val="000000"/>
+                  </a:solidFill>
+                </a:uFill>
+              </a:rPr>
+              <a:t>Change</a:t>
+            </a:r>
+            <a:r>
+              <a:rPr lang="en-US" dirty="0" smtClean="0">
+                <a:solidFill>
+                  <a:srgbClr val="000000"/>
+                </a:solidFill>
+                <a:uFill>
+                  <a:solidFill>
+                    <a:srgbClr val="000000"/>
+                  </a:solidFill>
+                </a:uFill>
+              </a:rPr>
+              <a:t> working directory to where you want to save the repo</a:t>
+            </a:r>
+          </a:p>
+          <a:p>
+            <a:pPr marL="342900" lvl="8" indent="-342900" algn="l" rtl="0" latinLnBrk="1" hangingPunct="0">
+              <a:buFont typeface="Arial" panose="020B0604020202020204" pitchFamily="34" charset="0"/>
+              <a:buChar char="•"/>
+            </a:pPr>
+            <a:r>
+              <a:rPr lang="en-US" dirty="0" err="1">
+                <a:solidFill>
+                  <a:srgbClr val="000000"/>
+                </a:solidFill>
+                <a:uFill>
+                  <a:solidFill>
+                    <a:srgbClr val="000000"/>
+                  </a:solidFill>
+                </a:uFill>
+              </a:rPr>
+              <a:t>g</a:t>
+            </a:r>
+            <a:r>
+              <a:rPr lang="en-US" dirty="0" err="1" smtClean="0">
+                <a:solidFill>
+                  <a:srgbClr val="000000"/>
+                </a:solidFill>
+                <a:uFill>
+                  <a:solidFill>
+                    <a:srgbClr val="000000"/>
+                  </a:solidFill>
+                </a:uFill>
+              </a:rPr>
+              <a:t>it</a:t>
+            </a:r>
+            <a:r>
+              <a:rPr lang="en-US" dirty="0" smtClean="0">
+                <a:solidFill>
+                  <a:srgbClr val="000000"/>
+                </a:solidFill>
+                <a:uFill>
+                  <a:solidFill>
+                    <a:srgbClr val="000000"/>
+                  </a:solidFill>
+                </a:uFill>
+              </a:rPr>
+              <a:t> clone [</a:t>
+            </a:r>
+            <a:r>
+              <a:rPr lang="en-US" dirty="0" err="1" smtClean="0">
+                <a:solidFill>
+                  <a:srgbClr val="000000"/>
+                </a:solidFill>
+                <a:uFill>
+                  <a:solidFill>
+                    <a:srgbClr val="000000"/>
+                  </a:solidFill>
+                </a:uFill>
+              </a:rPr>
+              <a:t>url</a:t>
+            </a:r>
+            <a:r>
+              <a:rPr lang="en-US" dirty="0" smtClean="0">
+                <a:solidFill>
+                  <a:srgbClr val="000000"/>
+                </a:solidFill>
+                <a:uFill>
+                  <a:solidFill>
+                    <a:srgbClr val="000000"/>
+                  </a:solidFill>
+                </a:uFill>
+              </a:rPr>
+              <a:t> of repo]</a:t>
+            </a:r>
+          </a:p>
+          <a:p>
+            <a:pPr marL="342900" lvl="8" indent="-342900" algn="l" rtl="0" latinLnBrk="1" hangingPunct="0">
+              <a:buFont typeface="Arial" panose="020B0604020202020204" pitchFamily="34" charset="0"/>
+              <a:buChar char="•"/>
+            </a:pPr>
+            <a:r>
+              <a:rPr lang="en-US" dirty="0" smtClean="0">
+                <a:solidFill>
+                  <a:srgbClr val="000000"/>
+                </a:solidFill>
+                <a:uFill>
+                  <a:solidFill>
+                    <a:srgbClr val="000000"/>
+                  </a:solidFill>
+                </a:uFill>
+              </a:rPr>
+              <a:t>Hit enter </a:t>
+            </a:r>
+          </a:p>
+          <a:p>
+            <a:pPr marL="342900" lvl="8" indent="-342900" algn="l" rtl="0" latinLnBrk="1" hangingPunct="0">
+              <a:buFont typeface="Arial" panose="020B0604020202020204" pitchFamily="34" charset="0"/>
+              <a:buChar char="•"/>
+            </a:pPr>
+            <a:r>
+              <a:rPr lang="en-US" dirty="0" smtClean="0">
+                <a:solidFill>
+                  <a:srgbClr val="000000"/>
+                </a:solidFill>
+                <a:uFill>
+                  <a:solidFill>
+                    <a:srgbClr val="000000"/>
+                  </a:solidFill>
+                </a:uFill>
+              </a:rPr>
+              <a:t>Type password</a:t>
+            </a:r>
+          </a:p>
+          <a:p>
+            <a:pPr marL="342900" lvl="8" indent="-342900" algn="l" rtl="0" latinLnBrk="1" hangingPunct="0">
+              <a:buFont typeface="Arial" panose="020B0604020202020204" pitchFamily="34" charset="0"/>
+              <a:buChar char="•"/>
+            </a:pPr>
+            <a:r>
+              <a:rPr lang="en-US" dirty="0" smtClean="0">
+                <a:solidFill>
+                  <a:srgbClr val="000000"/>
+                </a:solidFill>
+                <a:uFill>
+                  <a:solidFill>
+                    <a:srgbClr val="000000"/>
+                  </a:solidFill>
+                </a:uFill>
+              </a:rPr>
+              <a:t>Repo is copied to a sub directory of working directory</a:t>
+            </a:r>
+          </a:p>
+          <a:p>
+            <a:pPr marL="342900" lvl="8" indent="-342900" algn="l" rtl="0" latinLnBrk="1" hangingPunct="0">
+              <a:buFont typeface="Arial" panose="020B0604020202020204" pitchFamily="34" charset="0"/>
+              <a:buChar char="•"/>
+            </a:pPr>
             <a:endParaRPr kumimoji="0" lang="en-US" i="0" strike="noStrike" cap="none" spc="0" normalizeH="0" baseline="0" dirty="0">
               <a:ln>
                 <a:noFill/>
@@ -7167,7 +8610,7 @@
     </p:spTree>
     <p:extLst>
       <p:ext uri="{BB962C8B-B14F-4D97-AF65-F5344CB8AC3E}">
-        <p14:creationId xmlns:p14="http://schemas.microsoft.com/office/powerpoint/2010/main" val="1720275955"/>
+        <p14:creationId xmlns:p14="http://schemas.microsoft.com/office/powerpoint/2010/main" val="1263139275"/>
       </p:ext>
     </p:extLst>
   </p:cSld>

</xml_diff>